<commit_message>
Updates to Oct 5 slides.
</commit_message>
<xml_diff>
--- a/Slides/100520.pptx
+++ b/Slides/100520.pptx
@@ -5,10 +5,10 @@
     <p:sldMasterId id="2147483648" r:id="rId1"/>
   </p:sldMasterIdLst>
   <p:notesMasterIdLst>
-    <p:notesMasterId r:id="rId42"/>
+    <p:notesMasterId r:id="rId43"/>
   </p:notesMasterIdLst>
   <p:handoutMasterIdLst>
-    <p:handoutMasterId r:id="rId43"/>
+    <p:handoutMasterId r:id="rId44"/>
   </p:handoutMasterIdLst>
   <p:sldIdLst>
     <p:sldId id="258" r:id="rId2"/>
@@ -34,23 +34,24 @@
     <p:sldId id="530" r:id="rId22"/>
     <p:sldId id="536" r:id="rId23"/>
     <p:sldId id="502" r:id="rId24"/>
-    <p:sldId id="537" r:id="rId25"/>
-    <p:sldId id="540" r:id="rId26"/>
-    <p:sldId id="541" r:id="rId27"/>
-    <p:sldId id="542" r:id="rId28"/>
-    <p:sldId id="543" r:id="rId29"/>
-    <p:sldId id="544" r:id="rId30"/>
-    <p:sldId id="545" r:id="rId31"/>
-    <p:sldId id="547" r:id="rId32"/>
-    <p:sldId id="548" r:id="rId33"/>
-    <p:sldId id="549" r:id="rId34"/>
-    <p:sldId id="550" r:id="rId35"/>
-    <p:sldId id="554" r:id="rId36"/>
-    <p:sldId id="552" r:id="rId37"/>
-    <p:sldId id="553" r:id="rId38"/>
-    <p:sldId id="557" r:id="rId39"/>
-    <p:sldId id="556" r:id="rId40"/>
-    <p:sldId id="512" r:id="rId41"/>
+    <p:sldId id="558" r:id="rId25"/>
+    <p:sldId id="537" r:id="rId26"/>
+    <p:sldId id="540" r:id="rId27"/>
+    <p:sldId id="541" r:id="rId28"/>
+    <p:sldId id="542" r:id="rId29"/>
+    <p:sldId id="543" r:id="rId30"/>
+    <p:sldId id="544" r:id="rId31"/>
+    <p:sldId id="545" r:id="rId32"/>
+    <p:sldId id="547" r:id="rId33"/>
+    <p:sldId id="548" r:id="rId34"/>
+    <p:sldId id="549" r:id="rId35"/>
+    <p:sldId id="550" r:id="rId36"/>
+    <p:sldId id="554" r:id="rId37"/>
+    <p:sldId id="552" r:id="rId38"/>
+    <p:sldId id="553" r:id="rId39"/>
+    <p:sldId id="557" r:id="rId40"/>
+    <p:sldId id="556" r:id="rId41"/>
+    <p:sldId id="512" r:id="rId42"/>
   </p:sldIdLst>
   <p:sldSz cx="9144000" cy="6858000" type="screen4x3"/>
   <p:notesSz cx="7315200" cy="9601200"/>
@@ -1970,7 +1971,7 @@
               <a:pPr>
                 <a:defRPr/>
               </a:pPr>
-              <a:t>39</a:t>
+              <a:t>40</a:t>
             </a:fld>
             <a:endParaRPr lang="en-US"/>
           </a:p>
@@ -18857,6 +18858,240 @@
       </p:grpSpPr>
       <p:sp>
         <p:nvSpPr>
+          <p:cNvPr id="7" name="Title 6">
+            <a:extLst>
+              <a:ext uri="{FF2B5EF4-FFF2-40B4-BE49-F238E27FC236}">
+                <a16:creationId xmlns:a16="http://schemas.microsoft.com/office/drawing/2014/main" id="{18B2BE8A-FB78-F14E-9705-5747A324A509}"/>
+              </a:ext>
+            </a:extLst>
+          </p:cNvPr>
+          <p:cNvSpPr>
+            <a:spLocks noGrp="1"/>
+          </p:cNvSpPr>
+          <p:nvPr>
+            <p:ph type="title"/>
+          </p:nvPr>
+        </p:nvSpPr>
+        <p:spPr/>
+        <p:txBody>
+          <a:bodyPr/>
+          <a:lstStyle/>
+          <a:p>
+            <a:r>
+              <a:rPr lang="en-US" dirty="0"/>
+              <a:t>Announcements</a:t>
+            </a:r>
+          </a:p>
+        </p:txBody>
+      </p:sp>
+      <p:sp>
+        <p:nvSpPr>
+          <p:cNvPr id="8" name="Content Placeholder 7">
+            <a:extLst>
+              <a:ext uri="{FF2B5EF4-FFF2-40B4-BE49-F238E27FC236}">
+                <a16:creationId xmlns:a16="http://schemas.microsoft.com/office/drawing/2014/main" id="{A77E0B44-190E-D44E-A420-63A6B4DB2F71}"/>
+              </a:ext>
+            </a:extLst>
+          </p:cNvPr>
+          <p:cNvSpPr>
+            <a:spLocks noGrp="1"/>
+          </p:cNvSpPr>
+          <p:nvPr>
+            <p:ph idx="1"/>
+          </p:nvPr>
+        </p:nvSpPr>
+        <p:spPr/>
+        <p:txBody>
+          <a:bodyPr/>
+          <a:lstStyle/>
+          <a:p>
+            <a:r>
+              <a:rPr lang="en-US" dirty="0"/>
+              <a:t>90-minute midterm exam starts on</a:t>
+            </a:r>
+          </a:p>
+          <a:p>
+            <a:pPr lvl="1"/>
+            <a:r>
+              <a:rPr lang="en-US" b="1" dirty="0">
+                <a:solidFill>
+                  <a:srgbClr val="0000FF"/>
+                </a:solidFill>
+              </a:rPr>
+              <a:t>Oct 19: 3:30 PM</a:t>
+            </a:r>
+          </a:p>
+          <a:p>
+            <a:pPr lvl="1"/>
+            <a:r>
+              <a:rPr lang="en-US" b="1" dirty="0">
+                <a:solidFill>
+                  <a:srgbClr val="0000FF"/>
+                </a:solidFill>
+              </a:rPr>
+              <a:t>Oct 19: 11:30 PM</a:t>
+            </a:r>
+          </a:p>
+          <a:p>
+            <a:pPr lvl="1"/>
+            <a:endParaRPr lang="en-US" dirty="0"/>
+          </a:p>
+          <a:p>
+            <a:r>
+              <a:rPr lang="en-US" dirty="0"/>
+              <a:t>Sign up for your slot at </a:t>
+            </a:r>
+            <a:r>
+              <a:rPr lang="en-US" dirty="0">
+                <a:solidFill>
+                  <a:srgbClr val="0000FF"/>
+                </a:solidFill>
+              </a:rPr>
+              <a:t>https://</a:t>
+            </a:r>
+            <a:r>
+              <a:rPr lang="en-US" dirty="0" err="1">
+                <a:solidFill>
+                  <a:srgbClr val="0000FF"/>
+                </a:solidFill>
+              </a:rPr>
+              <a:t>forms.gle</a:t>
+            </a:r>
+            <a:r>
+              <a:rPr lang="en-US" dirty="0">
+                <a:solidFill>
+                  <a:srgbClr val="0000FF"/>
+                </a:solidFill>
+              </a:rPr>
+              <a:t>/deP3Z6fENaLHJLrH9</a:t>
+            </a:r>
+          </a:p>
+        </p:txBody>
+      </p:sp>
+      <p:sp>
+        <p:nvSpPr>
+          <p:cNvPr id="4" name="Date Placeholder 3">
+            <a:extLst>
+              <a:ext uri="{FF2B5EF4-FFF2-40B4-BE49-F238E27FC236}">
+                <a16:creationId xmlns:a16="http://schemas.microsoft.com/office/drawing/2014/main" id="{00B2988C-DB6C-9E4A-A4A0-9B9BB3527000}"/>
+              </a:ext>
+            </a:extLst>
+          </p:cNvPr>
+          <p:cNvSpPr>
+            <a:spLocks noGrp="1"/>
+          </p:cNvSpPr>
+          <p:nvPr>
+            <p:ph type="dt" sz="half" idx="10"/>
+          </p:nvPr>
+        </p:nvSpPr>
+        <p:spPr/>
+        <p:txBody>
+          <a:bodyPr/>
+          <a:lstStyle/>
+          <a:p>
+            <a:r>
+              <a:rPr lang="en-US"/>
+              <a:t>October 5, 2020</a:t>
+            </a:r>
+            <a:endParaRPr lang="en-US" sz="1050" b="0">
+              <a:latin typeface="Times New Roman" charset="0"/>
+            </a:endParaRPr>
+          </a:p>
+        </p:txBody>
+      </p:sp>
+      <p:sp>
+        <p:nvSpPr>
+          <p:cNvPr id="5" name="Footer Placeholder 4">
+            <a:extLst>
+              <a:ext uri="{FF2B5EF4-FFF2-40B4-BE49-F238E27FC236}">
+                <a16:creationId xmlns:a16="http://schemas.microsoft.com/office/drawing/2014/main" id="{AABD4119-94B7-104A-A298-A51B8177A4B4}"/>
+              </a:ext>
+            </a:extLst>
+          </p:cNvPr>
+          <p:cNvSpPr>
+            <a:spLocks noGrp="1"/>
+          </p:cNvSpPr>
+          <p:nvPr>
+            <p:ph type="ftr" sz="quarter" idx="11"/>
+          </p:nvPr>
+        </p:nvSpPr>
+        <p:spPr/>
+        <p:txBody>
+          <a:bodyPr/>
+          <a:lstStyle/>
+          <a:p>
+            <a:r>
+              <a:rPr lang="en-US"/>
+              <a:t>EECS 489 – Lecture 9</a:t>
+            </a:r>
+            <a:endParaRPr lang="en-US" sz="1050" b="0">
+              <a:latin typeface="Times New Roman" charset="0"/>
+            </a:endParaRPr>
+          </a:p>
+        </p:txBody>
+      </p:sp>
+      <p:sp>
+        <p:nvSpPr>
+          <p:cNvPr id="6" name="Slide Number Placeholder 5">
+            <a:extLst>
+              <a:ext uri="{FF2B5EF4-FFF2-40B4-BE49-F238E27FC236}">
+                <a16:creationId xmlns:a16="http://schemas.microsoft.com/office/drawing/2014/main" id="{646B5131-AE4A-AA4A-A62D-89115D748028}"/>
+              </a:ext>
+            </a:extLst>
+          </p:cNvPr>
+          <p:cNvSpPr>
+            <a:spLocks noGrp="1"/>
+          </p:cNvSpPr>
+          <p:nvPr>
+            <p:ph type="sldNum" sz="quarter" idx="12"/>
+          </p:nvPr>
+        </p:nvSpPr>
+        <p:spPr/>
+        <p:txBody>
+          <a:bodyPr/>
+          <a:lstStyle/>
+          <a:p>
+            <a:fld id="{81F2EB77-FB6C-2244-A076-ADF097535D48}" type="slidenum">
+              <a:rPr lang="en-US" smtClean="0"/>
+              <a:pPr/>
+              <a:t>24</a:t>
+            </a:fld>
+            <a:endParaRPr lang="en-US"/>
+          </a:p>
+        </p:txBody>
+      </p:sp>
+    </p:spTree>
+    <p:extLst>
+      <p:ext uri="{BB962C8B-B14F-4D97-AF65-F5344CB8AC3E}">
+        <p14:creationId xmlns:p14="http://schemas.microsoft.com/office/powerpoint/2010/main" val="1484661982"/>
+      </p:ext>
+    </p:extLst>
+  </p:cSld>
+  <p:clrMapOvr>
+    <a:masterClrMapping/>
+  </p:clrMapOvr>
+</p:sld>
+</file>
+
+<file path=ppt/slides/slide25.xml><?xml version="1.0" encoding="utf-8"?>
+<p:sld xmlns:a="http://schemas.openxmlformats.org/drawingml/2006/main" xmlns:r="http://schemas.openxmlformats.org/officeDocument/2006/relationships" xmlns:p="http://schemas.openxmlformats.org/presentationml/2006/main">
+  <p:cSld>
+    <p:spTree>
+      <p:nvGrpSpPr>
+        <p:cNvPr id="1" name=""/>
+        <p:cNvGrpSpPr/>
+        <p:nvPr/>
+      </p:nvGrpSpPr>
+      <p:grpSpPr>
+        <a:xfrm>
+          <a:off x="0" y="0"/>
+          <a:ext cx="0" cy="0"/>
+          <a:chOff x="0" y="0"/>
+          <a:chExt cx="0" cy="0"/>
+        </a:xfrm>
+      </p:grpSpPr>
+      <p:sp>
+        <p:nvSpPr>
           <p:cNvPr id="7" name="Title 6"/>
           <p:cNvSpPr>
             <a:spLocks noGrp="1"/>
@@ -18964,7 +19199,7 @@
             <a:fld id="{A190D881-957A-7944-A8D0-1584E528B88F}" type="slidenum">
               <a:rPr lang="en-US" smtClean="0"/>
               <a:pPr/>
-              <a:t>24</a:t>
+              <a:t>25</a:t>
             </a:fld>
             <a:endParaRPr lang="en-US"/>
           </a:p>
@@ -18983,7 +19218,7 @@
 </p:sld>
 </file>
 
-<file path=ppt/slides/slide25.xml><?xml version="1.0" encoding="utf-8"?>
+<file path=ppt/slides/slide26.xml><?xml version="1.0" encoding="utf-8"?>
 <p:sld xmlns:a="http://schemas.openxmlformats.org/drawingml/2006/main" xmlns:r="http://schemas.openxmlformats.org/officeDocument/2006/relationships" xmlns:p="http://schemas.openxmlformats.org/presentationml/2006/main">
   <p:cSld>
     <p:spTree>
@@ -21329,7 +21564,7 @@
           <a:graphicData uri="http://schemas.openxmlformats.org/presentationml/2006/ole">
             <mc:AlternateContent xmlns:mc="http://schemas.openxmlformats.org/markup-compatibility/2006">
               <mc:Choice xmlns:v="urn:schemas-microsoft-com:vml" Requires="v">
-                <p:oleObj spid="_x0000_s1184" name="Equation" r:id="rId3" imgW="317362" imgH="228501" progId="Equation.3">
+                <p:oleObj spid="_x0000_s1194" name="Equation" r:id="rId3" imgW="317362" imgH="228501" progId="Equation.3">
                   <p:embed/>
                 </p:oleObj>
               </mc:Choice>
@@ -21424,7 +21659,7 @@
           <a:graphicData uri="http://schemas.openxmlformats.org/presentationml/2006/ole">
             <mc:AlternateContent xmlns:mc="http://schemas.openxmlformats.org/markup-compatibility/2006">
               <mc:Choice xmlns:v="urn:schemas-microsoft-com:vml" Requires="v">
-                <p:oleObj spid="_x0000_s1185" name="Equation" r:id="rId5" imgW="355292" imgH="393359" progId="Equation.3">
+                <p:oleObj spid="_x0000_s1195" name="Equation" r:id="rId5" imgW="355292" imgH="393359" progId="Equation.3">
                   <p:embed/>
                 </p:oleObj>
               </mc:Choice>
@@ -21899,7 +22134,7 @@
             <a:fld id="{9507A418-0CEB-9E4A-BA45-3B7D3D133EB9}" type="slidenum">
               <a:rPr lang="en-US" smtClean="0"/>
               <a:pPr/>
-              <a:t>25</a:t>
+              <a:t>26</a:t>
             </a:fld>
             <a:endParaRPr lang="en-US"/>
           </a:p>
@@ -22155,7 +22390,7 @@
 </p:sld>
 </file>
 
-<file path=ppt/slides/slide26.xml><?xml version="1.0" encoding="utf-8"?>
+<file path=ppt/slides/slide27.xml><?xml version="1.0" encoding="utf-8"?>
 <p:sld xmlns:a="http://schemas.openxmlformats.org/drawingml/2006/main" xmlns:r="http://schemas.openxmlformats.org/officeDocument/2006/relationships" xmlns:p="http://schemas.openxmlformats.org/presentationml/2006/main">
   <p:cSld>
     <p:spTree>
@@ -22233,7 +22468,7 @@
           <a:graphicData uri="http://schemas.openxmlformats.org/presentationml/2006/ole">
             <mc:AlternateContent xmlns:mc="http://schemas.openxmlformats.org/markup-compatibility/2006">
               <mc:Choice xmlns:v="urn:schemas-microsoft-com:vml" Requires="v">
-                <p:oleObj spid="_x0000_s2287" name="Equation" r:id="rId3" imgW="2717800" imgH="1511300" progId="Equation.3">
+                <p:oleObj spid="_x0000_s2302" name="Equation" r:id="rId3" imgW="2717800" imgH="1511300" progId="Equation.3">
                   <p:embed/>
                 </p:oleObj>
               </mc:Choice>
@@ -23657,7 +23892,7 @@
           <a:graphicData uri="http://schemas.openxmlformats.org/presentationml/2006/ole">
             <mc:AlternateContent xmlns:mc="http://schemas.openxmlformats.org/markup-compatibility/2006">
               <mc:Choice xmlns:v="urn:schemas-microsoft-com:vml" Requires="v">
-                <p:oleObj spid="_x0000_s2288" name="Equation" r:id="rId5" imgW="317362" imgH="228501" progId="Equation.3">
+                <p:oleObj spid="_x0000_s2303" name="Equation" r:id="rId5" imgW="317362" imgH="228501" progId="Equation.3">
                   <p:embed/>
                 </p:oleObj>
               </mc:Choice>
@@ -23752,7 +23987,7 @@
           <a:graphicData uri="http://schemas.openxmlformats.org/presentationml/2006/ole">
             <mc:AlternateContent xmlns:mc="http://schemas.openxmlformats.org/markup-compatibility/2006">
               <mc:Choice xmlns:v="urn:schemas-microsoft-com:vml" Requires="v">
-                <p:oleObj spid="_x0000_s2289" name="Equation" r:id="rId7" imgW="355292" imgH="393359" progId="Equation.3">
+                <p:oleObj spid="_x0000_s2304" name="Equation" r:id="rId7" imgW="355292" imgH="393359" progId="Equation.3">
                   <p:embed/>
                 </p:oleObj>
               </mc:Choice>
@@ -24332,40 +24567,9 @@
             <a:fld id="{9507A418-0CEB-9E4A-BA45-3B7D3D133EB9}" type="slidenum">
               <a:rPr lang="en-US" smtClean="0"/>
               <a:pPr/>
-              <a:t>26</a:t>
+              <a:t>27</a:t>
             </a:fld>
             <a:endParaRPr lang="en-US"/>
-          </a:p>
-        </p:txBody>
-      </p:sp>
-      <p:sp>
-        <p:nvSpPr>
-          <p:cNvPr id="6" name="Footer Placeholder 5">
-            <a:extLst>
-              <a:ext uri="{FF2B5EF4-FFF2-40B4-BE49-F238E27FC236}">
-                <a16:creationId xmlns:a16="http://schemas.microsoft.com/office/drawing/2014/main" id="{9F95F761-7787-6C42-9CDE-8543E8FA12CE}"/>
-              </a:ext>
-            </a:extLst>
-          </p:cNvPr>
-          <p:cNvSpPr>
-            <a:spLocks noGrp="1"/>
-          </p:cNvSpPr>
-          <p:nvPr>
-            <p:ph type="ftr" sz="quarter" idx="11"/>
-          </p:nvPr>
-        </p:nvSpPr>
-        <p:spPr/>
-        <p:txBody>
-          <a:bodyPr/>
-          <a:lstStyle/>
-          <a:p>
-            <a:r>
-              <a:rPr lang="en-US"/>
-              <a:t>EECS 489 – Lecture 9</a:t>
-            </a:r>
-            <a:endParaRPr lang="en-US" sz="1050" b="0">
-              <a:latin typeface="Times New Roman" charset="0"/>
-            </a:endParaRPr>
           </a:p>
         </p:txBody>
       </p:sp>
@@ -24552,7 +24756,7 @@
 </p:sld>
 </file>
 
-<file path=ppt/slides/slide27.xml><?xml version="1.0" encoding="utf-8"?>
+<file path=ppt/slides/slide28.xml><?xml version="1.0" encoding="utf-8"?>
 <p:sld xmlns:a="http://schemas.openxmlformats.org/drawingml/2006/main" xmlns:r="http://schemas.openxmlformats.org/officeDocument/2006/relationships" xmlns:p="http://schemas.openxmlformats.org/presentationml/2006/main">
   <p:cSld>
     <p:spTree>
@@ -24668,7 +24872,7 @@
           <a:graphicData uri="http://schemas.openxmlformats.org/presentationml/2006/ole">
             <mc:AlternateContent xmlns:mc="http://schemas.openxmlformats.org/markup-compatibility/2006">
               <mc:Choice xmlns:v="urn:schemas-microsoft-com:vml" Requires="v">
-                <p:oleObj spid="_x0000_s3153" name="Equation" r:id="rId3" imgW="1663700" imgH="469900" progId="Equation.3">
+                <p:oleObj spid="_x0000_s3158" name="Equation" r:id="rId3" imgW="1663700" imgH="469900" progId="Equation.3">
                   <p:embed/>
                 </p:oleObj>
               </mc:Choice>
@@ -25632,7 +25836,7 @@
             <a:fld id="{9507A418-0CEB-9E4A-BA45-3B7D3D133EB9}" type="slidenum">
               <a:rPr lang="en-US" smtClean="0"/>
               <a:pPr/>
-              <a:t>27</a:t>
+              <a:t>28</a:t>
             </a:fld>
             <a:endParaRPr lang="en-US"/>
           </a:p>
@@ -25782,7 +25986,7 @@
 </p:sld>
 </file>
 
-<file path=ppt/slides/slide28.xml><?xml version="1.0" encoding="utf-8"?>
+<file path=ppt/slides/slide29.xml><?xml version="1.0" encoding="utf-8"?>
 <p:sld xmlns:a="http://schemas.openxmlformats.org/drawingml/2006/main" xmlns:r="http://schemas.openxmlformats.org/officeDocument/2006/relationships" xmlns:p="http://schemas.openxmlformats.org/presentationml/2006/main">
   <p:cSld>
     <p:spTree>
@@ -25921,7 +26125,7 @@
           <a:graphicData uri="http://schemas.openxmlformats.org/presentationml/2006/ole">
             <mc:AlternateContent xmlns:mc="http://schemas.openxmlformats.org/markup-compatibility/2006">
               <mc:Choice xmlns:v="urn:schemas-microsoft-com:vml" Requires="v">
-                <p:oleObj spid="_x0000_s4177" name="Equation" r:id="rId3" imgW="1663700" imgH="469900" progId="Equation.3">
+                <p:oleObj spid="_x0000_s4182" name="Equation" r:id="rId3" imgW="1663700" imgH="469900" progId="Equation.3">
                   <p:embed/>
                 </p:oleObj>
               </mc:Choice>
@@ -26031,7 +26235,7 @@
             <a:fld id="{A190D881-957A-7944-A8D0-1584E528B88F}" type="slidenum">
               <a:rPr lang="en-US" smtClean="0"/>
               <a:pPr/>
-              <a:t>28</a:t>
+              <a:t>29</a:t>
             </a:fld>
             <a:endParaRPr lang="en-US"/>
           </a:p>
@@ -26426,360 +26630,6 @@
 </p:sld>
 </file>
 
-<file path=ppt/slides/slide29.xml><?xml version="1.0" encoding="utf-8"?>
-<p:sld xmlns:a="http://schemas.openxmlformats.org/drawingml/2006/main" xmlns:r="http://schemas.openxmlformats.org/officeDocument/2006/relationships" xmlns:p="http://schemas.openxmlformats.org/presentationml/2006/main">
-  <p:cSld>
-    <p:spTree>
-      <p:nvGrpSpPr>
-        <p:cNvPr id="1" name=""/>
-        <p:cNvGrpSpPr/>
-        <p:nvPr/>
-      </p:nvGrpSpPr>
-      <p:grpSpPr>
-        <a:xfrm>
-          <a:off x="0" y="0"/>
-          <a:ext cx="0" cy="0"/>
-          <a:chOff x="0" y="0"/>
-          <a:chExt cx="0" cy="0"/>
-        </a:xfrm>
-      </p:grpSpPr>
-      <p:sp>
-        <p:nvSpPr>
-          <p:cNvPr id="2" name="Title 1"/>
-          <p:cNvSpPr>
-            <a:spLocks noGrp="1"/>
-          </p:cNvSpPr>
-          <p:nvPr>
-            <p:ph type="title"/>
-          </p:nvPr>
-        </p:nvSpPr>
-        <p:spPr/>
-        <p:txBody>
-          <a:bodyPr/>
-          <a:lstStyle/>
-          <a:p>
-            <a:r>
-              <a:rPr lang="en-US" dirty="0"/>
-              <a:t>Adapting TCP to high speed</a:t>
-            </a:r>
-          </a:p>
-        </p:txBody>
-      </p:sp>
-      <p:sp>
-        <p:nvSpPr>
-          <p:cNvPr id="3" name="Content Placeholder 2"/>
-          <p:cNvSpPr>
-            <a:spLocks noGrp="1"/>
-          </p:cNvSpPr>
-          <p:nvPr>
-            <p:ph idx="1"/>
-          </p:nvPr>
-        </p:nvSpPr>
-        <p:spPr/>
-        <p:txBody>
-          <a:bodyPr/>
-          <a:lstStyle/>
-          <a:p>
-            <a:r>
-              <a:rPr lang="en-US" dirty="0"/>
-              <a:t>Once past a threshold speed, increase CWND faster </a:t>
-            </a:r>
-          </a:p>
-          <a:p>
-            <a:pPr lvl="1"/>
-            <a:r>
-              <a:rPr lang="en-US" dirty="0"/>
-              <a:t>A proposed standard [Floyd’03]: once speed is past some threshold, change equation to p</a:t>
-            </a:r>
-            <a:r>
-              <a:rPr lang="en-US" baseline="30000" dirty="0"/>
-              <a:t>-.8</a:t>
-            </a:r>
-            <a:r>
-              <a:rPr lang="en-US" dirty="0"/>
-              <a:t> rather than p</a:t>
-            </a:r>
-            <a:r>
-              <a:rPr lang="en-US" baseline="30000" dirty="0"/>
-              <a:t>-.5</a:t>
-            </a:r>
-            <a:r>
-              <a:rPr lang="en-US" dirty="0"/>
-              <a:t> </a:t>
-            </a:r>
-          </a:p>
-          <a:p>
-            <a:pPr lvl="1"/>
-            <a:r>
-              <a:rPr lang="en-US" dirty="0"/>
-              <a:t>Let the additive constant in AIMD depend on CWND</a:t>
-            </a:r>
-          </a:p>
-          <a:p>
-            <a:r>
-              <a:rPr lang="en-US" dirty="0"/>
-              <a:t>Other approaches?</a:t>
-            </a:r>
-          </a:p>
-          <a:p>
-            <a:pPr lvl="1"/>
-            <a:r>
-              <a:rPr lang="en-US" dirty="0"/>
-              <a:t>Multiple simultaneous connections (</a:t>
-            </a:r>
-            <a:r>
-              <a:rPr lang="en-US" dirty="0">
-                <a:solidFill>
-                  <a:srgbClr val="0000FF"/>
-                </a:solidFill>
-              </a:rPr>
-              <a:t>hack but works today</a:t>
-            </a:r>
-            <a:r>
-              <a:rPr lang="en-US" dirty="0"/>
-              <a:t>)</a:t>
-            </a:r>
-          </a:p>
-          <a:p>
-            <a:pPr lvl="1"/>
-            <a:r>
-              <a:rPr lang="en-US" dirty="0"/>
-              <a:t>Router-assisted approaches </a:t>
-            </a:r>
-          </a:p>
-        </p:txBody>
-      </p:sp>
-      <p:sp>
-        <p:nvSpPr>
-          <p:cNvPr id="8" name="Date Placeholder 7"/>
-          <p:cNvSpPr>
-            <a:spLocks noGrp="1"/>
-          </p:cNvSpPr>
-          <p:nvPr>
-            <p:ph type="dt" sz="half" idx="10"/>
-          </p:nvPr>
-        </p:nvSpPr>
-        <p:spPr/>
-        <p:txBody>
-          <a:bodyPr/>
-          <a:lstStyle/>
-          <a:p>
-            <a:r>
-              <a:rPr lang="en-US"/>
-              <a:t>October 5, 2020</a:t>
-            </a:r>
-            <a:endParaRPr lang="en-US" sz="1050" b="0">
-              <a:latin typeface="Times New Roman" charset="0"/>
-            </a:endParaRPr>
-          </a:p>
-        </p:txBody>
-      </p:sp>
-      <p:sp>
-        <p:nvSpPr>
-          <p:cNvPr id="9" name="Footer Placeholder 8"/>
-          <p:cNvSpPr>
-            <a:spLocks noGrp="1"/>
-          </p:cNvSpPr>
-          <p:nvPr>
-            <p:ph type="ftr" sz="quarter" idx="11"/>
-          </p:nvPr>
-        </p:nvSpPr>
-        <p:spPr/>
-        <p:txBody>
-          <a:bodyPr/>
-          <a:lstStyle/>
-          <a:p>
-            <a:r>
-              <a:rPr lang="en-US"/>
-              <a:t>EECS 489 – Lecture 9</a:t>
-            </a:r>
-            <a:endParaRPr lang="en-US" sz="1050" b="0">
-              <a:latin typeface="Times New Roman" charset="0"/>
-            </a:endParaRPr>
-          </a:p>
-        </p:txBody>
-      </p:sp>
-      <p:sp>
-        <p:nvSpPr>
-          <p:cNvPr id="10" name="Slide Number Placeholder 9"/>
-          <p:cNvSpPr>
-            <a:spLocks noGrp="1"/>
-          </p:cNvSpPr>
-          <p:nvPr>
-            <p:ph type="sldNum" sz="quarter" idx="12"/>
-          </p:nvPr>
-        </p:nvSpPr>
-        <p:spPr/>
-        <p:txBody>
-          <a:bodyPr/>
-          <a:lstStyle/>
-          <a:p>
-            <a:fld id="{A190D881-957A-7944-A8D0-1584E528B88F}" type="slidenum">
-              <a:rPr lang="en-US" smtClean="0"/>
-              <a:pPr/>
-              <a:t>29</a:t>
-            </a:fld>
-            <a:endParaRPr lang="en-US"/>
-          </a:p>
-        </p:txBody>
-      </p:sp>
-    </p:spTree>
-    <p:extLst>
-      <p:ext uri="{BB962C8B-B14F-4D97-AF65-F5344CB8AC3E}">
-        <p14:creationId xmlns:p14="http://schemas.microsoft.com/office/powerpoint/2010/main" val="770244127"/>
-      </p:ext>
-    </p:extLst>
-  </p:cSld>
-  <p:clrMapOvr>
-    <a:masterClrMapping/>
-  </p:clrMapOvr>
-  <p:timing>
-    <p:tnLst>
-      <p:par>
-        <p:cTn id="1" dur="indefinite" restart="never" nodeType="tmRoot">
-          <p:childTnLst>
-            <p:seq concurrent="1" nextAc="seek">
-              <p:cTn id="2" dur="indefinite" nodeType="mainSeq">
-                <p:childTnLst>
-                  <p:par>
-                    <p:cTn id="3" fill="hold">
-                      <p:stCondLst>
-                        <p:cond delay="indefinite"/>
-                      </p:stCondLst>
-                      <p:childTnLst>
-                        <p:par>
-                          <p:cTn id="4" fill="hold">
-                            <p:stCondLst>
-                              <p:cond delay="0"/>
-                            </p:stCondLst>
-                            <p:childTnLst>
-                              <p:par>
-                                <p:cTn id="5" presetID="1" presetClass="entr" presetSubtype="0" fill="hold" grpId="0" nodeType="clickEffect">
-                                  <p:stCondLst>
-                                    <p:cond delay="0"/>
-                                  </p:stCondLst>
-                                  <p:childTnLst>
-                                    <p:set>
-                                      <p:cBhvr>
-                                        <p:cTn id="6" dur="1" fill="hold">
-                                          <p:stCondLst>
-                                            <p:cond delay="0"/>
-                                          </p:stCondLst>
-                                        </p:cTn>
-                                        <p:tgtEl>
-                                          <p:spTgt spid="3">
-                                            <p:txEl>
-                                              <p:pRg st="3" end="3"/>
-                                            </p:txEl>
-                                          </p:spTgt>
-                                        </p:tgtEl>
-                                        <p:attrNameLst>
-                                          <p:attrName>style.visibility</p:attrName>
-                                        </p:attrNameLst>
-                                      </p:cBhvr>
-                                      <p:to>
-                                        <p:strVal val="visible"/>
-                                      </p:to>
-                                    </p:set>
-                                  </p:childTnLst>
-                                </p:cTn>
-                              </p:par>
-                              <p:par>
-                                <p:cTn id="7" presetID="1" presetClass="entr" presetSubtype="0" fill="hold" grpId="0" nodeType="withEffect">
-                                  <p:stCondLst>
-                                    <p:cond delay="0"/>
-                                  </p:stCondLst>
-                                  <p:childTnLst>
-                                    <p:set>
-                                      <p:cBhvr>
-                                        <p:cTn id="8" dur="1" fill="hold">
-                                          <p:stCondLst>
-                                            <p:cond delay="0"/>
-                                          </p:stCondLst>
-                                        </p:cTn>
-                                        <p:tgtEl>
-                                          <p:spTgt spid="3">
-                                            <p:txEl>
-                                              <p:pRg st="4" end="4"/>
-                                            </p:txEl>
-                                          </p:spTgt>
-                                        </p:tgtEl>
-                                        <p:attrNameLst>
-                                          <p:attrName>style.visibility</p:attrName>
-                                        </p:attrNameLst>
-                                      </p:cBhvr>
-                                      <p:to>
-                                        <p:strVal val="visible"/>
-                                      </p:to>
-                                    </p:set>
-                                  </p:childTnLst>
-                                </p:cTn>
-                              </p:par>
-                              <p:par>
-                                <p:cTn id="9" presetID="1" presetClass="entr" presetSubtype="0" fill="hold" grpId="0" nodeType="withEffect">
-                                  <p:stCondLst>
-                                    <p:cond delay="0"/>
-                                  </p:stCondLst>
-                                  <p:childTnLst>
-                                    <p:set>
-                                      <p:cBhvr>
-                                        <p:cTn id="10" dur="1" fill="hold">
-                                          <p:stCondLst>
-                                            <p:cond delay="0"/>
-                                          </p:stCondLst>
-                                        </p:cTn>
-                                        <p:tgtEl>
-                                          <p:spTgt spid="3">
-                                            <p:txEl>
-                                              <p:pRg st="5" end="5"/>
-                                            </p:txEl>
-                                          </p:spTgt>
-                                        </p:tgtEl>
-                                        <p:attrNameLst>
-                                          <p:attrName>style.visibility</p:attrName>
-                                        </p:attrNameLst>
-                                      </p:cBhvr>
-                                      <p:to>
-                                        <p:strVal val="visible"/>
-                                      </p:to>
-                                    </p:set>
-                                  </p:childTnLst>
-                                </p:cTn>
-                              </p:par>
-                            </p:childTnLst>
-                          </p:cTn>
-                        </p:par>
-                      </p:childTnLst>
-                    </p:cTn>
-                  </p:par>
-                </p:childTnLst>
-              </p:cTn>
-              <p:prevCondLst>
-                <p:cond evt="onPrev" delay="0">
-                  <p:tgtEl>
-                    <p:sldTgt/>
-                  </p:tgtEl>
-                </p:cond>
-              </p:prevCondLst>
-              <p:nextCondLst>
-                <p:cond evt="onNext" delay="0">
-                  <p:tgtEl>
-                    <p:sldTgt/>
-                  </p:tgtEl>
-                </p:cond>
-              </p:nextCondLst>
-            </p:seq>
-          </p:childTnLst>
-        </p:cTn>
-      </p:par>
-    </p:tnLst>
-    <p:bldLst>
-      <p:bldP spid="3" grpId="0" uiExpand="1" build="p"/>
-    </p:bldLst>
-  </p:timing>
-</p:sld>
-</file>
-
 <file path=ppt/slides/slide3.xml><?xml version="1.0" encoding="utf-8"?>
 <p:sld xmlns:a="http://schemas.openxmlformats.org/drawingml/2006/main" xmlns:r="http://schemas.openxmlformats.org/officeDocument/2006/relationships" xmlns:p="http://schemas.openxmlformats.org/presentationml/2006/main">
   <p:cSld>
@@ -27277,6 +27127,360 @@
           <a:p>
             <a:r>
               <a:rPr lang="en-US" dirty="0"/>
+              <a:t>Adapting TCP to high speed</a:t>
+            </a:r>
+          </a:p>
+        </p:txBody>
+      </p:sp>
+      <p:sp>
+        <p:nvSpPr>
+          <p:cNvPr id="3" name="Content Placeholder 2"/>
+          <p:cNvSpPr>
+            <a:spLocks noGrp="1"/>
+          </p:cNvSpPr>
+          <p:nvPr>
+            <p:ph idx="1"/>
+          </p:nvPr>
+        </p:nvSpPr>
+        <p:spPr/>
+        <p:txBody>
+          <a:bodyPr/>
+          <a:lstStyle/>
+          <a:p>
+            <a:r>
+              <a:rPr lang="en-US" dirty="0"/>
+              <a:t>Once past a threshold speed, increase CWND faster </a:t>
+            </a:r>
+          </a:p>
+          <a:p>
+            <a:pPr lvl="1"/>
+            <a:r>
+              <a:rPr lang="en-US" dirty="0"/>
+              <a:t>A proposed standard [Floyd’03]: once speed is past some threshold, change equation to p</a:t>
+            </a:r>
+            <a:r>
+              <a:rPr lang="en-US" baseline="30000" dirty="0"/>
+              <a:t>-.8</a:t>
+            </a:r>
+            <a:r>
+              <a:rPr lang="en-US" dirty="0"/>
+              <a:t> rather than p</a:t>
+            </a:r>
+            <a:r>
+              <a:rPr lang="en-US" baseline="30000" dirty="0"/>
+              <a:t>-.5</a:t>
+            </a:r>
+            <a:r>
+              <a:rPr lang="en-US" dirty="0"/>
+              <a:t> </a:t>
+            </a:r>
+          </a:p>
+          <a:p>
+            <a:pPr lvl="1"/>
+            <a:r>
+              <a:rPr lang="en-US" dirty="0"/>
+              <a:t>Let the additive constant in AIMD depend on CWND</a:t>
+            </a:r>
+          </a:p>
+          <a:p>
+            <a:r>
+              <a:rPr lang="en-US" dirty="0"/>
+              <a:t>Other approaches?</a:t>
+            </a:r>
+          </a:p>
+          <a:p>
+            <a:pPr lvl="1"/>
+            <a:r>
+              <a:rPr lang="en-US" dirty="0"/>
+              <a:t>Multiple simultaneous connections (</a:t>
+            </a:r>
+            <a:r>
+              <a:rPr lang="en-US" dirty="0">
+                <a:solidFill>
+                  <a:srgbClr val="0000FF"/>
+                </a:solidFill>
+              </a:rPr>
+              <a:t>hack but works today</a:t>
+            </a:r>
+            <a:r>
+              <a:rPr lang="en-US" dirty="0"/>
+              <a:t>)</a:t>
+            </a:r>
+          </a:p>
+          <a:p>
+            <a:pPr lvl="1"/>
+            <a:r>
+              <a:rPr lang="en-US" dirty="0"/>
+              <a:t>Router-assisted approaches </a:t>
+            </a:r>
+          </a:p>
+        </p:txBody>
+      </p:sp>
+      <p:sp>
+        <p:nvSpPr>
+          <p:cNvPr id="8" name="Date Placeholder 7"/>
+          <p:cNvSpPr>
+            <a:spLocks noGrp="1"/>
+          </p:cNvSpPr>
+          <p:nvPr>
+            <p:ph type="dt" sz="half" idx="10"/>
+          </p:nvPr>
+        </p:nvSpPr>
+        <p:spPr/>
+        <p:txBody>
+          <a:bodyPr/>
+          <a:lstStyle/>
+          <a:p>
+            <a:r>
+              <a:rPr lang="en-US"/>
+              <a:t>October 5, 2020</a:t>
+            </a:r>
+            <a:endParaRPr lang="en-US" sz="1050" b="0">
+              <a:latin typeface="Times New Roman" charset="0"/>
+            </a:endParaRPr>
+          </a:p>
+        </p:txBody>
+      </p:sp>
+      <p:sp>
+        <p:nvSpPr>
+          <p:cNvPr id="9" name="Footer Placeholder 8"/>
+          <p:cNvSpPr>
+            <a:spLocks noGrp="1"/>
+          </p:cNvSpPr>
+          <p:nvPr>
+            <p:ph type="ftr" sz="quarter" idx="11"/>
+          </p:nvPr>
+        </p:nvSpPr>
+        <p:spPr/>
+        <p:txBody>
+          <a:bodyPr/>
+          <a:lstStyle/>
+          <a:p>
+            <a:r>
+              <a:rPr lang="en-US"/>
+              <a:t>EECS 489 – Lecture 9</a:t>
+            </a:r>
+            <a:endParaRPr lang="en-US" sz="1050" b="0">
+              <a:latin typeface="Times New Roman" charset="0"/>
+            </a:endParaRPr>
+          </a:p>
+        </p:txBody>
+      </p:sp>
+      <p:sp>
+        <p:nvSpPr>
+          <p:cNvPr id="10" name="Slide Number Placeholder 9"/>
+          <p:cNvSpPr>
+            <a:spLocks noGrp="1"/>
+          </p:cNvSpPr>
+          <p:nvPr>
+            <p:ph type="sldNum" sz="quarter" idx="12"/>
+          </p:nvPr>
+        </p:nvSpPr>
+        <p:spPr/>
+        <p:txBody>
+          <a:bodyPr/>
+          <a:lstStyle/>
+          <a:p>
+            <a:fld id="{A190D881-957A-7944-A8D0-1584E528B88F}" type="slidenum">
+              <a:rPr lang="en-US" smtClean="0"/>
+              <a:pPr/>
+              <a:t>30</a:t>
+            </a:fld>
+            <a:endParaRPr lang="en-US"/>
+          </a:p>
+        </p:txBody>
+      </p:sp>
+    </p:spTree>
+    <p:extLst>
+      <p:ext uri="{BB962C8B-B14F-4D97-AF65-F5344CB8AC3E}">
+        <p14:creationId xmlns:p14="http://schemas.microsoft.com/office/powerpoint/2010/main" val="770244127"/>
+      </p:ext>
+    </p:extLst>
+  </p:cSld>
+  <p:clrMapOvr>
+    <a:masterClrMapping/>
+  </p:clrMapOvr>
+  <p:timing>
+    <p:tnLst>
+      <p:par>
+        <p:cTn id="1" dur="indefinite" restart="never" nodeType="tmRoot">
+          <p:childTnLst>
+            <p:seq concurrent="1" nextAc="seek">
+              <p:cTn id="2" dur="indefinite" nodeType="mainSeq">
+                <p:childTnLst>
+                  <p:par>
+                    <p:cTn id="3" fill="hold">
+                      <p:stCondLst>
+                        <p:cond delay="indefinite"/>
+                      </p:stCondLst>
+                      <p:childTnLst>
+                        <p:par>
+                          <p:cTn id="4" fill="hold">
+                            <p:stCondLst>
+                              <p:cond delay="0"/>
+                            </p:stCondLst>
+                            <p:childTnLst>
+                              <p:par>
+                                <p:cTn id="5" presetID="1" presetClass="entr" presetSubtype="0" fill="hold" grpId="0" nodeType="clickEffect">
+                                  <p:stCondLst>
+                                    <p:cond delay="0"/>
+                                  </p:stCondLst>
+                                  <p:childTnLst>
+                                    <p:set>
+                                      <p:cBhvr>
+                                        <p:cTn id="6" dur="1" fill="hold">
+                                          <p:stCondLst>
+                                            <p:cond delay="0"/>
+                                          </p:stCondLst>
+                                        </p:cTn>
+                                        <p:tgtEl>
+                                          <p:spTgt spid="3">
+                                            <p:txEl>
+                                              <p:pRg st="3" end="3"/>
+                                            </p:txEl>
+                                          </p:spTgt>
+                                        </p:tgtEl>
+                                        <p:attrNameLst>
+                                          <p:attrName>style.visibility</p:attrName>
+                                        </p:attrNameLst>
+                                      </p:cBhvr>
+                                      <p:to>
+                                        <p:strVal val="visible"/>
+                                      </p:to>
+                                    </p:set>
+                                  </p:childTnLst>
+                                </p:cTn>
+                              </p:par>
+                              <p:par>
+                                <p:cTn id="7" presetID="1" presetClass="entr" presetSubtype="0" fill="hold" grpId="0" nodeType="withEffect">
+                                  <p:stCondLst>
+                                    <p:cond delay="0"/>
+                                  </p:stCondLst>
+                                  <p:childTnLst>
+                                    <p:set>
+                                      <p:cBhvr>
+                                        <p:cTn id="8" dur="1" fill="hold">
+                                          <p:stCondLst>
+                                            <p:cond delay="0"/>
+                                          </p:stCondLst>
+                                        </p:cTn>
+                                        <p:tgtEl>
+                                          <p:spTgt spid="3">
+                                            <p:txEl>
+                                              <p:pRg st="4" end="4"/>
+                                            </p:txEl>
+                                          </p:spTgt>
+                                        </p:tgtEl>
+                                        <p:attrNameLst>
+                                          <p:attrName>style.visibility</p:attrName>
+                                        </p:attrNameLst>
+                                      </p:cBhvr>
+                                      <p:to>
+                                        <p:strVal val="visible"/>
+                                      </p:to>
+                                    </p:set>
+                                  </p:childTnLst>
+                                </p:cTn>
+                              </p:par>
+                              <p:par>
+                                <p:cTn id="9" presetID="1" presetClass="entr" presetSubtype="0" fill="hold" grpId="0" nodeType="withEffect">
+                                  <p:stCondLst>
+                                    <p:cond delay="0"/>
+                                  </p:stCondLst>
+                                  <p:childTnLst>
+                                    <p:set>
+                                      <p:cBhvr>
+                                        <p:cTn id="10" dur="1" fill="hold">
+                                          <p:stCondLst>
+                                            <p:cond delay="0"/>
+                                          </p:stCondLst>
+                                        </p:cTn>
+                                        <p:tgtEl>
+                                          <p:spTgt spid="3">
+                                            <p:txEl>
+                                              <p:pRg st="5" end="5"/>
+                                            </p:txEl>
+                                          </p:spTgt>
+                                        </p:tgtEl>
+                                        <p:attrNameLst>
+                                          <p:attrName>style.visibility</p:attrName>
+                                        </p:attrNameLst>
+                                      </p:cBhvr>
+                                      <p:to>
+                                        <p:strVal val="visible"/>
+                                      </p:to>
+                                    </p:set>
+                                  </p:childTnLst>
+                                </p:cTn>
+                              </p:par>
+                            </p:childTnLst>
+                          </p:cTn>
+                        </p:par>
+                      </p:childTnLst>
+                    </p:cTn>
+                  </p:par>
+                </p:childTnLst>
+              </p:cTn>
+              <p:prevCondLst>
+                <p:cond evt="onPrev" delay="0">
+                  <p:tgtEl>
+                    <p:sldTgt/>
+                  </p:tgtEl>
+                </p:cond>
+              </p:prevCondLst>
+              <p:nextCondLst>
+                <p:cond evt="onNext" delay="0">
+                  <p:tgtEl>
+                    <p:sldTgt/>
+                  </p:tgtEl>
+                </p:cond>
+              </p:nextCondLst>
+            </p:seq>
+          </p:childTnLst>
+        </p:cTn>
+      </p:par>
+    </p:tnLst>
+    <p:bldLst>
+      <p:bldP spid="3" grpId="0" uiExpand="1" build="p"/>
+    </p:bldLst>
+  </p:timing>
+</p:sld>
+</file>
+
+<file path=ppt/slides/slide31.xml><?xml version="1.0" encoding="utf-8"?>
+<p:sld xmlns:a="http://schemas.openxmlformats.org/drawingml/2006/main" xmlns:r="http://schemas.openxmlformats.org/officeDocument/2006/relationships" xmlns:p="http://schemas.openxmlformats.org/presentationml/2006/main">
+  <p:cSld>
+    <p:spTree>
+      <p:nvGrpSpPr>
+        <p:cNvPr id="1" name=""/>
+        <p:cNvGrpSpPr/>
+        <p:nvPr/>
+      </p:nvGrpSpPr>
+      <p:grpSpPr>
+        <a:xfrm>
+          <a:off x="0" y="0"/>
+          <a:ext cx="0" cy="0"/>
+          <a:chOff x="0" y="0"/>
+          <a:chExt cx="0" cy="0"/>
+        </a:xfrm>
+      </p:grpSpPr>
+      <p:sp>
+        <p:nvSpPr>
+          <p:cNvPr id="2" name="Title 1"/>
+          <p:cNvSpPr>
+            <a:spLocks noGrp="1"/>
+          </p:cNvSpPr>
+          <p:nvPr>
+            <p:ph type="title"/>
+          </p:nvPr>
+        </p:nvSpPr>
+        <p:spPr/>
+        <p:txBody>
+          <a:bodyPr/>
+          <a:lstStyle/>
+          <a:p>
+            <a:r>
+              <a:rPr lang="en-US" dirty="0"/>
               <a:t>Implications (3): </a:t>
             </a:r>
             <a:br>
@@ -27395,7 +27599,7 @@
           <a:graphicData uri="http://schemas.openxmlformats.org/presentationml/2006/ole">
             <mc:AlternateContent xmlns:mc="http://schemas.openxmlformats.org/markup-compatibility/2006">
               <mc:Choice xmlns:v="urn:schemas-microsoft-com:vml" Requires="v">
-                <p:oleObj spid="_x0000_s5201" name="Equation" r:id="rId3" imgW="1663700" imgH="469900" progId="Equation.3">
+                <p:oleObj spid="_x0000_s5206" name="Equation" r:id="rId3" imgW="1663700" imgH="469900" progId="Equation.3">
                   <p:embed/>
                 </p:oleObj>
               </mc:Choice>
@@ -27505,7 +27709,7 @@
             <a:fld id="{A190D881-957A-7944-A8D0-1584E528B88F}" type="slidenum">
               <a:rPr lang="en-US" smtClean="0"/>
               <a:pPr/>
-              <a:t>30</a:t>
+              <a:t>31</a:t>
             </a:fld>
             <a:endParaRPr lang="en-US"/>
           </a:p>
@@ -27846,7 +28050,7 @@
 </p:sld>
 </file>
 
-<file path=ppt/slides/slide31.xml><?xml version="1.0" encoding="utf-8"?>
+<file path=ppt/slides/slide32.xml><?xml version="1.0" encoding="utf-8"?>
 <p:sld xmlns:a="http://schemas.openxmlformats.org/drawingml/2006/main" xmlns:r="http://schemas.openxmlformats.org/officeDocument/2006/relationships" xmlns:p="http://schemas.openxmlformats.org/presentationml/2006/main">
   <p:cSld>
     <p:spTree>
@@ -28013,7 +28217,7 @@
             <a:fld id="{A190D881-957A-7944-A8D0-1584E528B88F}" type="slidenum">
               <a:rPr lang="en-US" smtClean="0"/>
               <a:pPr/>
-              <a:t>31</a:t>
+              <a:t>32</a:t>
             </a:fld>
             <a:endParaRPr lang="en-US"/>
           </a:p>
@@ -28225,7 +28429,7 @@
 </p:sld>
 </file>
 
-<file path=ppt/slides/slide32.xml><?xml version="1.0" encoding="utf-8"?>
+<file path=ppt/slides/slide33.xml><?xml version="1.0" encoding="utf-8"?>
 <p:sld xmlns:a="http://schemas.openxmlformats.org/drawingml/2006/main" xmlns:r="http://schemas.openxmlformats.org/officeDocument/2006/relationships" xmlns:p="http://schemas.openxmlformats.org/presentationml/2006/main">
   <p:cSld>
     <p:spTree>
@@ -28426,7 +28630,7 @@
             <a:fld id="{A190D881-957A-7944-A8D0-1584E528B88F}" type="slidenum">
               <a:rPr lang="en-US" smtClean="0"/>
               <a:pPr/>
-              <a:t>32</a:t>
+              <a:t>33</a:t>
             </a:fld>
             <a:endParaRPr lang="en-US"/>
           </a:p>
@@ -28731,7 +28935,7 @@
 </p:sld>
 </file>
 
-<file path=ppt/slides/slide33.xml><?xml version="1.0" encoding="utf-8"?>
+<file path=ppt/slides/slide34.xml><?xml version="1.0" encoding="utf-8"?>
 <p:sld xmlns:a="http://schemas.openxmlformats.org/drawingml/2006/main" xmlns:r="http://schemas.openxmlformats.org/officeDocument/2006/relationships" xmlns:p="http://schemas.openxmlformats.org/presentationml/2006/main">
   <p:cSld>
     <p:spTree>
@@ -28899,7 +29103,7 @@
             <a:fld id="{A190D881-957A-7944-A8D0-1584E528B88F}" type="slidenum">
               <a:rPr lang="en-US" smtClean="0"/>
               <a:pPr/>
-              <a:t>33</a:t>
+              <a:t>34</a:t>
             </a:fld>
             <a:endParaRPr lang="en-US"/>
           </a:p>
@@ -29111,172 +29315,6 @@
 </p:sld>
 </file>
 
-<file path=ppt/slides/slide34.xml><?xml version="1.0" encoding="utf-8"?>
-<p:sld xmlns:a="http://schemas.openxmlformats.org/drawingml/2006/main" xmlns:r="http://schemas.openxmlformats.org/officeDocument/2006/relationships" xmlns:p="http://schemas.openxmlformats.org/presentationml/2006/main">
-  <p:cSld>
-    <p:spTree>
-      <p:nvGrpSpPr>
-        <p:cNvPr id="1" name=""/>
-        <p:cNvGrpSpPr/>
-        <p:nvPr/>
-      </p:nvGrpSpPr>
-      <p:grpSpPr>
-        <a:xfrm>
-          <a:off x="0" y="0"/>
-          <a:ext cx="0" cy="0"/>
-          <a:chOff x="0" y="0"/>
-          <a:chExt cx="0" cy="0"/>
-        </a:xfrm>
-      </p:grpSpPr>
-      <p:sp>
-        <p:nvSpPr>
-          <p:cNvPr id="1050626" name="Rectangle 2"/>
-          <p:cNvSpPr>
-            <a:spLocks noGrp="1" noChangeArrowheads="1"/>
-          </p:cNvSpPr>
-          <p:nvPr>
-            <p:ph type="title"/>
-          </p:nvPr>
-        </p:nvSpPr>
-        <p:spPr/>
-        <p:txBody>
-          <a:bodyPr/>
-          <a:lstStyle/>
-          <a:p>
-            <a:r>
-              <a:rPr lang="en-US" dirty="0"/>
-              <a:t>Implications (7): </a:t>
-            </a:r>
-            <a:br>
-              <a:rPr lang="en-US" dirty="0"/>
-            </a:br>
-            <a:r>
-              <a:rPr lang="en-US" dirty="0"/>
-              <a:t>Cheating</a:t>
-            </a:r>
-          </a:p>
-        </p:txBody>
-      </p:sp>
-      <p:sp>
-        <p:nvSpPr>
-          <p:cNvPr id="1050627" name="Rectangle 3"/>
-          <p:cNvSpPr>
-            <a:spLocks noGrp="1" noChangeArrowheads="1"/>
-          </p:cNvSpPr>
-          <p:nvPr>
-            <p:ph idx="1"/>
-          </p:nvPr>
-        </p:nvSpPr>
-        <p:spPr/>
-        <p:txBody>
-          <a:bodyPr/>
-          <a:lstStyle/>
-          <a:p>
-            <a:r>
-              <a:rPr lang="en-US" dirty="0"/>
-              <a:t>Three easy ways to cheat</a:t>
-            </a:r>
-          </a:p>
-          <a:p>
-            <a:pPr lvl="1"/>
-            <a:r>
-              <a:rPr lang="en-US" dirty="0"/>
-              <a:t>Increasing CWND faster than +1 MSS per RTT</a:t>
-            </a:r>
-          </a:p>
-          <a:p>
-            <a:pPr lvl="1"/>
-            <a:endParaRPr lang="en-US" dirty="0"/>
-          </a:p>
-        </p:txBody>
-      </p:sp>
-      <p:sp>
-        <p:nvSpPr>
-          <p:cNvPr id="4" name="Date Placeholder 3"/>
-          <p:cNvSpPr>
-            <a:spLocks noGrp="1"/>
-          </p:cNvSpPr>
-          <p:nvPr>
-            <p:ph type="dt" sz="half" idx="10"/>
-          </p:nvPr>
-        </p:nvSpPr>
-        <p:spPr/>
-        <p:txBody>
-          <a:bodyPr/>
-          <a:lstStyle/>
-          <a:p>
-            <a:r>
-              <a:rPr lang="en-US"/>
-              <a:t>October 5, 2020</a:t>
-            </a:r>
-            <a:endParaRPr lang="en-US" sz="1050" b="0">
-              <a:latin typeface="Times New Roman" charset="0"/>
-            </a:endParaRPr>
-          </a:p>
-        </p:txBody>
-      </p:sp>
-      <p:sp>
-        <p:nvSpPr>
-          <p:cNvPr id="5" name="Footer Placeholder 4"/>
-          <p:cNvSpPr>
-            <a:spLocks noGrp="1"/>
-          </p:cNvSpPr>
-          <p:nvPr>
-            <p:ph type="ftr" sz="quarter" idx="11"/>
-          </p:nvPr>
-        </p:nvSpPr>
-        <p:spPr/>
-        <p:txBody>
-          <a:bodyPr/>
-          <a:lstStyle/>
-          <a:p>
-            <a:r>
-              <a:rPr lang="en-US"/>
-              <a:t>EECS 489 – Lecture 9</a:t>
-            </a:r>
-            <a:endParaRPr lang="en-US" sz="1050" b="0">
-              <a:latin typeface="Times New Roman" charset="0"/>
-            </a:endParaRPr>
-          </a:p>
-        </p:txBody>
-      </p:sp>
-      <p:sp>
-        <p:nvSpPr>
-          <p:cNvPr id="6" name="Slide Number Placeholder 5"/>
-          <p:cNvSpPr>
-            <a:spLocks noGrp="1"/>
-          </p:cNvSpPr>
-          <p:nvPr>
-            <p:ph type="sldNum" sz="quarter" idx="12"/>
-          </p:nvPr>
-        </p:nvSpPr>
-        <p:spPr/>
-        <p:txBody>
-          <a:bodyPr/>
-          <a:lstStyle/>
-          <a:p>
-            <a:fld id="{A190D881-957A-7944-A8D0-1584E528B88F}" type="slidenum">
-              <a:rPr lang="en-US" smtClean="0"/>
-              <a:pPr/>
-              <a:t>34</a:t>
-            </a:fld>
-            <a:endParaRPr lang="en-US"/>
-          </a:p>
-        </p:txBody>
-      </p:sp>
-    </p:spTree>
-    <p:extLst>
-      <p:ext uri="{BB962C8B-B14F-4D97-AF65-F5344CB8AC3E}">
-        <p14:creationId xmlns:p14="http://schemas.microsoft.com/office/powerpoint/2010/main" val="691297075"/>
-      </p:ext>
-    </p:extLst>
-  </p:cSld>
-  <p:clrMapOvr>
-    <a:masterClrMapping/>
-  </p:clrMapOvr>
-</p:sld>
-</file>
-
 <file path=ppt/slides/slide35.xml><?xml version="1.0" encoding="utf-8"?>
 <p:sld xmlns:a="http://schemas.openxmlformats.org/drawingml/2006/main" xmlns:r="http://schemas.openxmlformats.org/officeDocument/2006/relationships" xmlns:p="http://schemas.openxmlformats.org/presentationml/2006/main">
   <p:cSld>
@@ -29310,6 +29348,172 @@
           <a:lstStyle/>
           <a:p>
             <a:r>
+              <a:rPr lang="en-US" dirty="0"/>
+              <a:t>Implications (7): </a:t>
+            </a:r>
+            <a:br>
+              <a:rPr lang="en-US" dirty="0"/>
+            </a:br>
+            <a:r>
+              <a:rPr lang="en-US" dirty="0"/>
+              <a:t>Cheating</a:t>
+            </a:r>
+          </a:p>
+        </p:txBody>
+      </p:sp>
+      <p:sp>
+        <p:nvSpPr>
+          <p:cNvPr id="1050627" name="Rectangle 3"/>
+          <p:cNvSpPr>
+            <a:spLocks noGrp="1" noChangeArrowheads="1"/>
+          </p:cNvSpPr>
+          <p:nvPr>
+            <p:ph idx="1"/>
+          </p:nvPr>
+        </p:nvSpPr>
+        <p:spPr/>
+        <p:txBody>
+          <a:bodyPr/>
+          <a:lstStyle/>
+          <a:p>
+            <a:r>
+              <a:rPr lang="en-US" dirty="0"/>
+              <a:t>Three easy ways to cheat</a:t>
+            </a:r>
+          </a:p>
+          <a:p>
+            <a:pPr lvl="1"/>
+            <a:r>
+              <a:rPr lang="en-US" dirty="0"/>
+              <a:t>Increasing CWND faster than +1 MSS per RTT</a:t>
+            </a:r>
+          </a:p>
+          <a:p>
+            <a:pPr lvl="1"/>
+            <a:endParaRPr lang="en-US" dirty="0"/>
+          </a:p>
+        </p:txBody>
+      </p:sp>
+      <p:sp>
+        <p:nvSpPr>
+          <p:cNvPr id="4" name="Date Placeholder 3"/>
+          <p:cNvSpPr>
+            <a:spLocks noGrp="1"/>
+          </p:cNvSpPr>
+          <p:nvPr>
+            <p:ph type="dt" sz="half" idx="10"/>
+          </p:nvPr>
+        </p:nvSpPr>
+        <p:spPr/>
+        <p:txBody>
+          <a:bodyPr/>
+          <a:lstStyle/>
+          <a:p>
+            <a:r>
+              <a:rPr lang="en-US"/>
+              <a:t>October 5, 2020</a:t>
+            </a:r>
+            <a:endParaRPr lang="en-US" sz="1050" b="0">
+              <a:latin typeface="Times New Roman" charset="0"/>
+            </a:endParaRPr>
+          </a:p>
+        </p:txBody>
+      </p:sp>
+      <p:sp>
+        <p:nvSpPr>
+          <p:cNvPr id="5" name="Footer Placeholder 4"/>
+          <p:cNvSpPr>
+            <a:spLocks noGrp="1"/>
+          </p:cNvSpPr>
+          <p:nvPr>
+            <p:ph type="ftr" sz="quarter" idx="11"/>
+          </p:nvPr>
+        </p:nvSpPr>
+        <p:spPr/>
+        <p:txBody>
+          <a:bodyPr/>
+          <a:lstStyle/>
+          <a:p>
+            <a:r>
+              <a:rPr lang="en-US"/>
+              <a:t>EECS 489 – Lecture 9</a:t>
+            </a:r>
+            <a:endParaRPr lang="en-US" sz="1050" b="0">
+              <a:latin typeface="Times New Roman" charset="0"/>
+            </a:endParaRPr>
+          </a:p>
+        </p:txBody>
+      </p:sp>
+      <p:sp>
+        <p:nvSpPr>
+          <p:cNvPr id="6" name="Slide Number Placeholder 5"/>
+          <p:cNvSpPr>
+            <a:spLocks noGrp="1"/>
+          </p:cNvSpPr>
+          <p:nvPr>
+            <p:ph type="sldNum" sz="quarter" idx="12"/>
+          </p:nvPr>
+        </p:nvSpPr>
+        <p:spPr/>
+        <p:txBody>
+          <a:bodyPr/>
+          <a:lstStyle/>
+          <a:p>
+            <a:fld id="{A190D881-957A-7944-A8D0-1584E528B88F}" type="slidenum">
+              <a:rPr lang="en-US" smtClean="0"/>
+              <a:pPr/>
+              <a:t>35</a:t>
+            </a:fld>
+            <a:endParaRPr lang="en-US"/>
+          </a:p>
+        </p:txBody>
+      </p:sp>
+    </p:spTree>
+    <p:extLst>
+      <p:ext uri="{BB962C8B-B14F-4D97-AF65-F5344CB8AC3E}">
+        <p14:creationId xmlns:p14="http://schemas.microsoft.com/office/powerpoint/2010/main" val="691297075"/>
+      </p:ext>
+    </p:extLst>
+  </p:cSld>
+  <p:clrMapOvr>
+    <a:masterClrMapping/>
+  </p:clrMapOvr>
+</p:sld>
+</file>
+
+<file path=ppt/slides/slide36.xml><?xml version="1.0" encoding="utf-8"?>
+<p:sld xmlns:a="http://schemas.openxmlformats.org/drawingml/2006/main" xmlns:r="http://schemas.openxmlformats.org/officeDocument/2006/relationships" xmlns:p="http://schemas.openxmlformats.org/presentationml/2006/main">
+  <p:cSld>
+    <p:spTree>
+      <p:nvGrpSpPr>
+        <p:cNvPr id="1" name=""/>
+        <p:cNvGrpSpPr/>
+        <p:nvPr/>
+      </p:nvGrpSpPr>
+      <p:grpSpPr>
+        <a:xfrm>
+          <a:off x="0" y="0"/>
+          <a:ext cx="0" cy="0"/>
+          <a:chOff x="0" y="0"/>
+          <a:chExt cx="0" cy="0"/>
+        </a:xfrm>
+      </p:grpSpPr>
+      <p:sp>
+        <p:nvSpPr>
+          <p:cNvPr id="1050626" name="Rectangle 2"/>
+          <p:cNvSpPr>
+            <a:spLocks noGrp="1" noChangeArrowheads="1"/>
+          </p:cNvSpPr>
+          <p:nvPr>
+            <p:ph type="title"/>
+          </p:nvPr>
+        </p:nvSpPr>
+        <p:spPr/>
+        <p:txBody>
+          <a:bodyPr/>
+          <a:lstStyle/>
+          <a:p>
+            <a:r>
               <a:rPr lang="en-US"/>
               <a:t>Implications (7): </a:t>
             </a:r>
@@ -29429,7 +29633,7 @@
             <a:fld id="{A190D881-957A-7944-A8D0-1584E528B88F}" type="slidenum">
               <a:rPr lang="en-US" smtClean="0"/>
               <a:pPr/>
-              <a:t>35</a:t>
+              <a:t>36</a:t>
             </a:fld>
             <a:endParaRPr lang="en-US"/>
           </a:p>
@@ -29527,7 +29731,7 @@
 </p:sld>
 </file>
 
-<file path=ppt/slides/slide36.xml><?xml version="1.0" encoding="utf-8"?>
+<file path=ppt/slides/slide37.xml><?xml version="1.0" encoding="utf-8"?>
 <p:sld xmlns:a="http://schemas.openxmlformats.org/drawingml/2006/main" xmlns:r="http://schemas.openxmlformats.org/officeDocument/2006/relationships" xmlns:p="http://schemas.openxmlformats.org/presentationml/2006/main">
   <p:cSld>
     <p:spTree>
@@ -29695,7 +29899,7 @@
             <a:fld id="{A190D881-957A-7944-A8D0-1584E528B88F}" type="slidenum">
               <a:rPr lang="en-US" smtClean="0"/>
               <a:pPr/>
-              <a:t>36</a:t>
+              <a:t>37</a:t>
             </a:fld>
             <a:endParaRPr lang="en-US"/>
           </a:p>
@@ -29714,7 +29918,7 @@
 </p:sld>
 </file>
 
-<file path=ppt/slides/slide37.xml><?xml version="1.0" encoding="utf-8"?>
+<file path=ppt/slides/slide38.xml><?xml version="1.0" encoding="utf-8"?>
 <p:sld xmlns:a="http://schemas.openxmlformats.org/drawingml/2006/main" xmlns:r="http://schemas.openxmlformats.org/officeDocument/2006/relationships" xmlns:p="http://schemas.openxmlformats.org/presentationml/2006/main">
   <p:cSld>
     <p:spTree>
@@ -31174,7 +31378,7 @@
             <a:fld id="{A190D881-957A-7944-A8D0-1584E528B88F}" type="slidenum">
               <a:rPr lang="en-US" smtClean="0"/>
               <a:pPr/>
-              <a:t>37</a:t>
+              <a:t>38</a:t>
             </a:fld>
             <a:endParaRPr lang="en-US"/>
           </a:p>
@@ -31193,7 +31397,7 @@
 </p:sld>
 </file>
 
-<file path=ppt/slides/slide38.xml><?xml version="1.0" encoding="utf-8"?>
+<file path=ppt/slides/slide39.xml><?xml version="1.0" encoding="utf-8"?>
 <p:sld xmlns:a="http://schemas.openxmlformats.org/drawingml/2006/main" xmlns:r="http://schemas.openxmlformats.org/officeDocument/2006/relationships" xmlns:p="http://schemas.openxmlformats.org/presentationml/2006/main">
   <p:cSld>
     <p:spTree>
@@ -31380,7 +31584,7 @@
             <a:fld id="{A190D881-957A-7944-A8D0-1584E528B88F}" type="slidenum">
               <a:rPr lang="en-US" smtClean="0"/>
               <a:pPr/>
-              <a:t>38</a:t>
+              <a:t>39</a:t>
             </a:fld>
             <a:endParaRPr lang="en-US"/>
           </a:p>
@@ -31739,7 +31943,577 @@
 </p:sld>
 </file>
 
-<file path=ppt/slides/slide39.xml><?xml version="1.0" encoding="utf-8"?>
+<file path=ppt/slides/slide4.xml><?xml version="1.0" encoding="utf-8"?>
+<p:sld xmlns:a="http://schemas.openxmlformats.org/drawingml/2006/main" xmlns:r="http://schemas.openxmlformats.org/officeDocument/2006/relationships" xmlns:p="http://schemas.openxmlformats.org/presentationml/2006/main">
+  <p:cSld>
+    <p:spTree>
+      <p:nvGrpSpPr>
+        <p:cNvPr id="1" name=""/>
+        <p:cNvGrpSpPr/>
+        <p:nvPr/>
+      </p:nvGrpSpPr>
+      <p:grpSpPr>
+        <a:xfrm>
+          <a:off x="0" y="0"/>
+          <a:ext cx="0" cy="0"/>
+          <a:chOff x="0" y="0"/>
+          <a:chExt cx="0" cy="0"/>
+        </a:xfrm>
+      </p:grpSpPr>
+      <p:sp>
+        <p:nvSpPr>
+          <p:cNvPr id="2" name="Title 1"/>
+          <p:cNvSpPr>
+            <a:spLocks noGrp="1"/>
+          </p:cNvSpPr>
+          <p:nvPr>
+            <p:ph type="title"/>
+          </p:nvPr>
+        </p:nvSpPr>
+        <p:spPr/>
+        <p:txBody>
+          <a:bodyPr/>
+          <a:lstStyle/>
+          <a:p>
+            <a:r>
+              <a:rPr lang="en-US" dirty="0"/>
+              <a:t>CC Implementation</a:t>
+            </a:r>
+          </a:p>
+        </p:txBody>
+      </p:sp>
+      <p:sp>
+        <p:nvSpPr>
+          <p:cNvPr id="3" name="Content Placeholder 2"/>
+          <p:cNvSpPr>
+            <a:spLocks noGrp="1"/>
+          </p:cNvSpPr>
+          <p:nvPr>
+            <p:ph idx="1"/>
+          </p:nvPr>
+        </p:nvSpPr>
+        <p:spPr/>
+        <p:txBody>
+          <a:bodyPr/>
+          <a:lstStyle/>
+          <a:p>
+            <a:r>
+              <a:rPr lang="en-US" dirty="0"/>
+              <a:t>States at sender</a:t>
+            </a:r>
+          </a:p>
+          <a:p>
+            <a:pPr lvl="1"/>
+            <a:r>
+              <a:rPr lang="en-US" dirty="0">
+                <a:solidFill>
+                  <a:srgbClr val="0000FF"/>
+                </a:solidFill>
+              </a:rPr>
+              <a:t>CWND</a:t>
+            </a:r>
+            <a:r>
+              <a:rPr lang="en-US" dirty="0"/>
+              <a:t> (initialized to a small constant)</a:t>
+            </a:r>
+          </a:p>
+          <a:p>
+            <a:pPr lvl="1"/>
+            <a:r>
+              <a:rPr lang="en-US" dirty="0" err="1">
+                <a:solidFill>
+                  <a:srgbClr val="0000FF"/>
+                </a:solidFill>
+              </a:rPr>
+              <a:t>ssthresh</a:t>
+            </a:r>
+            <a:r>
+              <a:rPr lang="en-US" dirty="0"/>
+              <a:t> (initialized to a large constant)</a:t>
+            </a:r>
+          </a:p>
+          <a:p>
+            <a:pPr lvl="1"/>
+            <a:r>
+              <a:rPr lang="en-US" dirty="0" err="1">
+                <a:solidFill>
+                  <a:srgbClr val="0000FF"/>
+                </a:solidFill>
+              </a:rPr>
+              <a:t>dupACKcount</a:t>
+            </a:r>
+            <a:r>
+              <a:rPr lang="en-US" dirty="0"/>
+              <a:t> and </a:t>
+            </a:r>
+            <a:r>
+              <a:rPr lang="en-US" dirty="0">
+                <a:solidFill>
+                  <a:srgbClr val="0000FF"/>
+                </a:solidFill>
+              </a:rPr>
+              <a:t>timer</a:t>
+            </a:r>
+            <a:endParaRPr lang="en-US" dirty="0"/>
+          </a:p>
+          <a:p>
+            <a:r>
+              <a:rPr lang="en-US" dirty="0"/>
+              <a:t>Events </a:t>
+            </a:r>
+          </a:p>
+          <a:p>
+            <a:pPr lvl="1"/>
+            <a:r>
+              <a:rPr lang="en-US" dirty="0">
+                <a:solidFill>
+                  <a:srgbClr val="0000FF"/>
+                </a:solidFill>
+              </a:rPr>
+              <a:t>ACK</a:t>
+            </a:r>
+            <a:r>
+              <a:rPr lang="en-US" dirty="0"/>
+              <a:t> (new data) </a:t>
+            </a:r>
+          </a:p>
+          <a:p>
+            <a:pPr lvl="1"/>
+            <a:r>
+              <a:rPr lang="en-US" dirty="0">
+                <a:solidFill>
+                  <a:srgbClr val="0000FF"/>
+                </a:solidFill>
+              </a:rPr>
+              <a:t>dupACK</a:t>
+            </a:r>
+            <a:r>
+              <a:rPr lang="en-US" dirty="0"/>
+              <a:t> (duplicate ACK for old data)</a:t>
+            </a:r>
+          </a:p>
+          <a:p>
+            <a:pPr lvl="1"/>
+            <a:r>
+              <a:rPr lang="en-US" dirty="0">
+                <a:solidFill>
+                  <a:srgbClr val="0000FF"/>
+                </a:solidFill>
+              </a:rPr>
+              <a:t>Timeout</a:t>
+            </a:r>
+            <a:r>
+              <a:rPr lang="en-US" dirty="0"/>
+              <a:t> </a:t>
+            </a:r>
+          </a:p>
+        </p:txBody>
+      </p:sp>
+      <p:sp>
+        <p:nvSpPr>
+          <p:cNvPr id="10" name="Date Placeholder 9"/>
+          <p:cNvSpPr>
+            <a:spLocks noGrp="1"/>
+          </p:cNvSpPr>
+          <p:nvPr>
+            <p:ph type="dt" sz="half" idx="10"/>
+          </p:nvPr>
+        </p:nvSpPr>
+        <p:spPr/>
+        <p:txBody>
+          <a:bodyPr/>
+          <a:lstStyle/>
+          <a:p>
+            <a:r>
+              <a:rPr lang="en-US"/>
+              <a:t>October 5, 2020</a:t>
+            </a:r>
+            <a:endParaRPr lang="en-US" sz="1050" b="0">
+              <a:latin typeface="Times New Roman" charset="0"/>
+            </a:endParaRPr>
+          </a:p>
+        </p:txBody>
+      </p:sp>
+      <p:sp>
+        <p:nvSpPr>
+          <p:cNvPr id="11" name="Footer Placeholder 10"/>
+          <p:cNvSpPr>
+            <a:spLocks noGrp="1"/>
+          </p:cNvSpPr>
+          <p:nvPr>
+            <p:ph type="ftr" sz="quarter" idx="11"/>
+          </p:nvPr>
+        </p:nvSpPr>
+        <p:spPr/>
+        <p:txBody>
+          <a:bodyPr/>
+          <a:lstStyle/>
+          <a:p>
+            <a:r>
+              <a:rPr lang="en-US"/>
+              <a:t>EECS 489 – Lecture 9</a:t>
+            </a:r>
+            <a:endParaRPr lang="en-US" sz="1050" b="0">
+              <a:latin typeface="Times New Roman" charset="0"/>
+            </a:endParaRPr>
+          </a:p>
+        </p:txBody>
+      </p:sp>
+      <p:sp>
+        <p:nvSpPr>
+          <p:cNvPr id="12" name="Slide Number Placeholder 11"/>
+          <p:cNvSpPr>
+            <a:spLocks noGrp="1"/>
+          </p:cNvSpPr>
+          <p:nvPr>
+            <p:ph type="sldNum" sz="quarter" idx="12"/>
+          </p:nvPr>
+        </p:nvSpPr>
+        <p:spPr/>
+        <p:txBody>
+          <a:bodyPr/>
+          <a:lstStyle/>
+          <a:p>
+            <a:fld id="{A190D881-957A-7944-A8D0-1584E528B88F}" type="slidenum">
+              <a:rPr lang="en-US" smtClean="0"/>
+              <a:pPr/>
+              <a:t>4</a:t>
+            </a:fld>
+            <a:endParaRPr lang="en-US"/>
+          </a:p>
+        </p:txBody>
+      </p:sp>
+    </p:spTree>
+    <p:extLst>
+      <p:ext uri="{BB962C8B-B14F-4D97-AF65-F5344CB8AC3E}">
+        <p14:creationId xmlns:p14="http://schemas.microsoft.com/office/powerpoint/2010/main" val="352562801"/>
+      </p:ext>
+    </p:extLst>
+  </p:cSld>
+  <p:clrMapOvr>
+    <a:masterClrMapping/>
+  </p:clrMapOvr>
+  <p:timing>
+    <p:tnLst>
+      <p:par>
+        <p:cTn id="1" dur="indefinite" restart="never" nodeType="tmRoot">
+          <p:childTnLst>
+            <p:seq concurrent="1" nextAc="seek">
+              <p:cTn id="2" dur="indefinite" nodeType="mainSeq">
+                <p:childTnLst>
+                  <p:par>
+                    <p:cTn id="3" fill="hold">
+                      <p:stCondLst>
+                        <p:cond delay="indefinite"/>
+                      </p:stCondLst>
+                      <p:childTnLst>
+                        <p:par>
+                          <p:cTn id="4" fill="hold">
+                            <p:stCondLst>
+                              <p:cond delay="0"/>
+                            </p:stCondLst>
+                            <p:childTnLst>
+                              <p:par>
+                                <p:cTn id="5" presetID="1" presetClass="entr" presetSubtype="0" fill="hold" grpId="0" nodeType="clickEffect">
+                                  <p:stCondLst>
+                                    <p:cond delay="0"/>
+                                  </p:stCondLst>
+                                  <p:childTnLst>
+                                    <p:set>
+                                      <p:cBhvr>
+                                        <p:cTn id="6" dur="1" fill="hold">
+                                          <p:stCondLst>
+                                            <p:cond delay="0"/>
+                                          </p:stCondLst>
+                                        </p:cTn>
+                                        <p:tgtEl>
+                                          <p:spTgt spid="3">
+                                            <p:txEl>
+                                              <p:pRg st="0" end="0"/>
+                                            </p:txEl>
+                                          </p:spTgt>
+                                        </p:tgtEl>
+                                        <p:attrNameLst>
+                                          <p:attrName>style.visibility</p:attrName>
+                                        </p:attrNameLst>
+                                      </p:cBhvr>
+                                      <p:to>
+                                        <p:strVal val="visible"/>
+                                      </p:to>
+                                    </p:set>
+                                  </p:childTnLst>
+                                </p:cTn>
+                              </p:par>
+                              <p:par>
+                                <p:cTn id="7" presetID="1" presetClass="entr" presetSubtype="0" fill="hold" grpId="0" nodeType="withEffect">
+                                  <p:stCondLst>
+                                    <p:cond delay="0"/>
+                                  </p:stCondLst>
+                                  <p:childTnLst>
+                                    <p:set>
+                                      <p:cBhvr>
+                                        <p:cTn id="8" dur="1" fill="hold">
+                                          <p:stCondLst>
+                                            <p:cond delay="0"/>
+                                          </p:stCondLst>
+                                        </p:cTn>
+                                        <p:tgtEl>
+                                          <p:spTgt spid="3">
+                                            <p:txEl>
+                                              <p:pRg st="1" end="1"/>
+                                            </p:txEl>
+                                          </p:spTgt>
+                                        </p:tgtEl>
+                                        <p:attrNameLst>
+                                          <p:attrName>style.visibility</p:attrName>
+                                        </p:attrNameLst>
+                                      </p:cBhvr>
+                                      <p:to>
+                                        <p:strVal val="visible"/>
+                                      </p:to>
+                                    </p:set>
+                                  </p:childTnLst>
+                                </p:cTn>
+                              </p:par>
+                              <p:par>
+                                <p:cTn id="9" presetID="1" presetClass="entr" presetSubtype="0" fill="hold" grpId="0" nodeType="withEffect">
+                                  <p:stCondLst>
+                                    <p:cond delay="0"/>
+                                  </p:stCondLst>
+                                  <p:childTnLst>
+                                    <p:set>
+                                      <p:cBhvr>
+                                        <p:cTn id="10" dur="1" fill="hold">
+                                          <p:stCondLst>
+                                            <p:cond delay="0"/>
+                                          </p:stCondLst>
+                                        </p:cTn>
+                                        <p:tgtEl>
+                                          <p:spTgt spid="3">
+                                            <p:txEl>
+                                              <p:pRg st="2" end="2"/>
+                                            </p:txEl>
+                                          </p:spTgt>
+                                        </p:tgtEl>
+                                        <p:attrNameLst>
+                                          <p:attrName>style.visibility</p:attrName>
+                                        </p:attrNameLst>
+                                      </p:cBhvr>
+                                      <p:to>
+                                        <p:strVal val="visible"/>
+                                      </p:to>
+                                    </p:set>
+                                  </p:childTnLst>
+                                </p:cTn>
+                              </p:par>
+                              <p:par>
+                                <p:cTn id="11" presetID="1" presetClass="entr" presetSubtype="0" fill="hold" grpId="0" nodeType="withEffect">
+                                  <p:stCondLst>
+                                    <p:cond delay="0"/>
+                                  </p:stCondLst>
+                                  <p:childTnLst>
+                                    <p:set>
+                                      <p:cBhvr>
+                                        <p:cTn id="12" dur="1" fill="hold">
+                                          <p:stCondLst>
+                                            <p:cond delay="0"/>
+                                          </p:stCondLst>
+                                        </p:cTn>
+                                        <p:tgtEl>
+                                          <p:spTgt spid="3">
+                                            <p:txEl>
+                                              <p:pRg st="3" end="3"/>
+                                            </p:txEl>
+                                          </p:spTgt>
+                                        </p:tgtEl>
+                                        <p:attrNameLst>
+                                          <p:attrName>style.visibility</p:attrName>
+                                        </p:attrNameLst>
+                                      </p:cBhvr>
+                                      <p:to>
+                                        <p:strVal val="visible"/>
+                                      </p:to>
+                                    </p:set>
+                                  </p:childTnLst>
+                                </p:cTn>
+                              </p:par>
+                            </p:childTnLst>
+                          </p:cTn>
+                        </p:par>
+                      </p:childTnLst>
+                    </p:cTn>
+                  </p:par>
+                  <p:par>
+                    <p:cTn id="13" fill="hold">
+                      <p:stCondLst>
+                        <p:cond delay="indefinite"/>
+                      </p:stCondLst>
+                      <p:childTnLst>
+                        <p:par>
+                          <p:cTn id="14" fill="hold">
+                            <p:stCondLst>
+                              <p:cond delay="0"/>
+                            </p:stCondLst>
+                            <p:childTnLst>
+                              <p:par>
+                                <p:cTn id="15" presetID="1" presetClass="entr" presetSubtype="0" fill="hold" grpId="0" nodeType="clickEffect">
+                                  <p:stCondLst>
+                                    <p:cond delay="0"/>
+                                  </p:stCondLst>
+                                  <p:childTnLst>
+                                    <p:set>
+                                      <p:cBhvr>
+                                        <p:cTn id="16" dur="1" fill="hold">
+                                          <p:stCondLst>
+                                            <p:cond delay="0"/>
+                                          </p:stCondLst>
+                                        </p:cTn>
+                                        <p:tgtEl>
+                                          <p:spTgt spid="3">
+                                            <p:txEl>
+                                              <p:pRg st="4" end="4"/>
+                                            </p:txEl>
+                                          </p:spTgt>
+                                        </p:tgtEl>
+                                        <p:attrNameLst>
+                                          <p:attrName>style.visibility</p:attrName>
+                                        </p:attrNameLst>
+                                      </p:cBhvr>
+                                      <p:to>
+                                        <p:strVal val="visible"/>
+                                      </p:to>
+                                    </p:set>
+                                  </p:childTnLst>
+                                </p:cTn>
+                              </p:par>
+                              <p:par>
+                                <p:cTn id="17" presetID="1" presetClass="entr" presetSubtype="0" fill="hold" grpId="0" nodeType="withEffect">
+                                  <p:stCondLst>
+                                    <p:cond delay="0"/>
+                                  </p:stCondLst>
+                                  <p:childTnLst>
+                                    <p:set>
+                                      <p:cBhvr>
+                                        <p:cTn id="18" dur="1" fill="hold">
+                                          <p:stCondLst>
+                                            <p:cond delay="0"/>
+                                          </p:stCondLst>
+                                        </p:cTn>
+                                        <p:tgtEl>
+                                          <p:spTgt spid="3">
+                                            <p:txEl>
+                                              <p:pRg st="5" end="5"/>
+                                            </p:txEl>
+                                          </p:spTgt>
+                                        </p:tgtEl>
+                                        <p:attrNameLst>
+                                          <p:attrName>style.visibility</p:attrName>
+                                        </p:attrNameLst>
+                                      </p:cBhvr>
+                                      <p:to>
+                                        <p:strVal val="visible"/>
+                                      </p:to>
+                                    </p:set>
+                                  </p:childTnLst>
+                                </p:cTn>
+                              </p:par>
+                              <p:par>
+                                <p:cTn id="19" presetID="1" presetClass="entr" presetSubtype="0" fill="hold" grpId="0" nodeType="withEffect">
+                                  <p:stCondLst>
+                                    <p:cond delay="0"/>
+                                  </p:stCondLst>
+                                  <p:childTnLst>
+                                    <p:set>
+                                      <p:cBhvr>
+                                        <p:cTn id="20" dur="1" fill="hold">
+                                          <p:stCondLst>
+                                            <p:cond delay="0"/>
+                                          </p:stCondLst>
+                                        </p:cTn>
+                                        <p:tgtEl>
+                                          <p:spTgt spid="3">
+                                            <p:txEl>
+                                              <p:pRg st="6" end="6"/>
+                                            </p:txEl>
+                                          </p:spTgt>
+                                        </p:tgtEl>
+                                        <p:attrNameLst>
+                                          <p:attrName>style.visibility</p:attrName>
+                                        </p:attrNameLst>
+                                      </p:cBhvr>
+                                      <p:to>
+                                        <p:strVal val="visible"/>
+                                      </p:to>
+                                    </p:set>
+                                  </p:childTnLst>
+                                </p:cTn>
+                              </p:par>
+                              <p:par>
+                                <p:cTn id="21" presetID="1" presetClass="entr" presetSubtype="0" fill="hold" grpId="0" nodeType="withEffect">
+                                  <p:stCondLst>
+                                    <p:cond delay="0"/>
+                                  </p:stCondLst>
+                                  <p:childTnLst>
+                                    <p:set>
+                                      <p:cBhvr>
+                                        <p:cTn id="22" dur="1" fill="hold">
+                                          <p:stCondLst>
+                                            <p:cond delay="0"/>
+                                          </p:stCondLst>
+                                        </p:cTn>
+                                        <p:tgtEl>
+                                          <p:spTgt spid="3">
+                                            <p:txEl>
+                                              <p:pRg st="7" end="7"/>
+                                            </p:txEl>
+                                          </p:spTgt>
+                                        </p:tgtEl>
+                                        <p:attrNameLst>
+                                          <p:attrName>style.visibility</p:attrName>
+                                        </p:attrNameLst>
+                                      </p:cBhvr>
+                                      <p:to>
+                                        <p:strVal val="visible"/>
+                                      </p:to>
+                                    </p:set>
+                                  </p:childTnLst>
+                                </p:cTn>
+                              </p:par>
+                            </p:childTnLst>
+                          </p:cTn>
+                        </p:par>
+                      </p:childTnLst>
+                    </p:cTn>
+                  </p:par>
+                </p:childTnLst>
+              </p:cTn>
+              <p:prevCondLst>
+                <p:cond evt="onPrev" delay="0">
+                  <p:tgtEl>
+                    <p:sldTgt/>
+                  </p:tgtEl>
+                </p:cond>
+              </p:prevCondLst>
+              <p:nextCondLst>
+                <p:cond evt="onNext" delay="0">
+                  <p:tgtEl>
+                    <p:sldTgt/>
+                  </p:tgtEl>
+                </p:cond>
+              </p:nextCondLst>
+            </p:seq>
+          </p:childTnLst>
+        </p:cTn>
+      </p:par>
+    </p:tnLst>
+    <p:bldLst>
+      <p:bldP spid="3" grpId="0" build="p"/>
+    </p:bldLst>
+  </p:timing>
+</p:sld>
+</file>
+
+<file path=ppt/slides/slide40.xml><?xml version="1.0" encoding="utf-8"?>
 <p:sld xmlns:a="http://schemas.openxmlformats.org/drawingml/2006/main" xmlns:r="http://schemas.openxmlformats.org/officeDocument/2006/relationships" xmlns:p="http://schemas.openxmlformats.org/presentationml/2006/main">
   <p:cSld>
     <p:spTree>
@@ -32513,7 +33287,7 @@
             <a:fld id="{A190D881-957A-7944-A8D0-1584E528B88F}" type="slidenum">
               <a:rPr lang="en-US" smtClean="0"/>
               <a:pPr/>
-              <a:t>39</a:t>
+              <a:t>40</a:t>
             </a:fld>
             <a:endParaRPr lang="en-US"/>
           </a:p>
@@ -33366,7 +34140,7 @@
 </p:sld>
 </file>
 
-<file path=ppt/slides/slide4.xml><?xml version="1.0" encoding="utf-8"?>
+<file path=ppt/slides/slide41.xml><?xml version="1.0" encoding="utf-8"?>
 <p:sld xmlns:a="http://schemas.openxmlformats.org/drawingml/2006/main" xmlns:r="http://schemas.openxmlformats.org/officeDocument/2006/relationships" xmlns:p="http://schemas.openxmlformats.org/presentationml/2006/main">
   <p:cSld>
     <p:spTree>
@@ -33400,7 +34174,7 @@
           <a:p>
             <a:r>
               <a:rPr lang="en-US" dirty="0"/>
-              <a:t>CC Implementation</a:t>
+              <a:t>Summary</a:t>
             </a:r>
           </a:p>
         </p:txBody>
@@ -33422,576 +34196,6 @@
           <a:p>
             <a:r>
               <a:rPr lang="en-US" dirty="0"/>
-              <a:t>States at sender</a:t>
-            </a:r>
-          </a:p>
-          <a:p>
-            <a:pPr lvl="1"/>
-            <a:r>
-              <a:rPr lang="en-US" dirty="0">
-                <a:solidFill>
-                  <a:srgbClr val="0000FF"/>
-                </a:solidFill>
-              </a:rPr>
-              <a:t>CWND</a:t>
-            </a:r>
-            <a:r>
-              <a:rPr lang="en-US" dirty="0"/>
-              <a:t> (initialized to a small constant)</a:t>
-            </a:r>
-          </a:p>
-          <a:p>
-            <a:pPr lvl="1"/>
-            <a:r>
-              <a:rPr lang="en-US" dirty="0" err="1">
-                <a:solidFill>
-                  <a:srgbClr val="0000FF"/>
-                </a:solidFill>
-              </a:rPr>
-              <a:t>ssthresh</a:t>
-            </a:r>
-            <a:r>
-              <a:rPr lang="en-US" dirty="0"/>
-              <a:t> (initialized to a large constant)</a:t>
-            </a:r>
-          </a:p>
-          <a:p>
-            <a:pPr lvl="1"/>
-            <a:r>
-              <a:rPr lang="en-US" dirty="0" err="1">
-                <a:solidFill>
-                  <a:srgbClr val="0000FF"/>
-                </a:solidFill>
-              </a:rPr>
-              <a:t>dupACKcount</a:t>
-            </a:r>
-            <a:r>
-              <a:rPr lang="en-US" dirty="0"/>
-              <a:t> and </a:t>
-            </a:r>
-            <a:r>
-              <a:rPr lang="en-US" dirty="0">
-                <a:solidFill>
-                  <a:srgbClr val="0000FF"/>
-                </a:solidFill>
-              </a:rPr>
-              <a:t>timer</a:t>
-            </a:r>
-            <a:endParaRPr lang="en-US" dirty="0"/>
-          </a:p>
-          <a:p>
-            <a:r>
-              <a:rPr lang="en-US" dirty="0"/>
-              <a:t>Events </a:t>
-            </a:r>
-          </a:p>
-          <a:p>
-            <a:pPr lvl="1"/>
-            <a:r>
-              <a:rPr lang="en-US" dirty="0">
-                <a:solidFill>
-                  <a:srgbClr val="0000FF"/>
-                </a:solidFill>
-              </a:rPr>
-              <a:t>ACK</a:t>
-            </a:r>
-            <a:r>
-              <a:rPr lang="en-US" dirty="0"/>
-              <a:t> (new data) </a:t>
-            </a:r>
-          </a:p>
-          <a:p>
-            <a:pPr lvl="1"/>
-            <a:r>
-              <a:rPr lang="en-US" dirty="0">
-                <a:solidFill>
-                  <a:srgbClr val="0000FF"/>
-                </a:solidFill>
-              </a:rPr>
-              <a:t>dupACK</a:t>
-            </a:r>
-            <a:r>
-              <a:rPr lang="en-US" dirty="0"/>
-              <a:t> (duplicate ACK for old data)</a:t>
-            </a:r>
-          </a:p>
-          <a:p>
-            <a:pPr lvl="1"/>
-            <a:r>
-              <a:rPr lang="en-US" dirty="0">
-                <a:solidFill>
-                  <a:srgbClr val="0000FF"/>
-                </a:solidFill>
-              </a:rPr>
-              <a:t>Timeout</a:t>
-            </a:r>
-            <a:r>
-              <a:rPr lang="en-US" dirty="0"/>
-              <a:t> </a:t>
-            </a:r>
-          </a:p>
-        </p:txBody>
-      </p:sp>
-      <p:sp>
-        <p:nvSpPr>
-          <p:cNvPr id="10" name="Date Placeholder 9"/>
-          <p:cNvSpPr>
-            <a:spLocks noGrp="1"/>
-          </p:cNvSpPr>
-          <p:nvPr>
-            <p:ph type="dt" sz="half" idx="10"/>
-          </p:nvPr>
-        </p:nvSpPr>
-        <p:spPr/>
-        <p:txBody>
-          <a:bodyPr/>
-          <a:lstStyle/>
-          <a:p>
-            <a:r>
-              <a:rPr lang="en-US"/>
-              <a:t>October 5, 2020</a:t>
-            </a:r>
-            <a:endParaRPr lang="en-US" sz="1050" b="0">
-              <a:latin typeface="Times New Roman" charset="0"/>
-            </a:endParaRPr>
-          </a:p>
-        </p:txBody>
-      </p:sp>
-      <p:sp>
-        <p:nvSpPr>
-          <p:cNvPr id="11" name="Footer Placeholder 10"/>
-          <p:cNvSpPr>
-            <a:spLocks noGrp="1"/>
-          </p:cNvSpPr>
-          <p:nvPr>
-            <p:ph type="ftr" sz="quarter" idx="11"/>
-          </p:nvPr>
-        </p:nvSpPr>
-        <p:spPr/>
-        <p:txBody>
-          <a:bodyPr/>
-          <a:lstStyle/>
-          <a:p>
-            <a:r>
-              <a:rPr lang="en-US"/>
-              <a:t>EECS 489 – Lecture 9</a:t>
-            </a:r>
-            <a:endParaRPr lang="en-US" sz="1050" b="0">
-              <a:latin typeface="Times New Roman" charset="0"/>
-            </a:endParaRPr>
-          </a:p>
-        </p:txBody>
-      </p:sp>
-      <p:sp>
-        <p:nvSpPr>
-          <p:cNvPr id="12" name="Slide Number Placeholder 11"/>
-          <p:cNvSpPr>
-            <a:spLocks noGrp="1"/>
-          </p:cNvSpPr>
-          <p:nvPr>
-            <p:ph type="sldNum" sz="quarter" idx="12"/>
-          </p:nvPr>
-        </p:nvSpPr>
-        <p:spPr/>
-        <p:txBody>
-          <a:bodyPr/>
-          <a:lstStyle/>
-          <a:p>
-            <a:fld id="{A190D881-957A-7944-A8D0-1584E528B88F}" type="slidenum">
-              <a:rPr lang="en-US" smtClean="0"/>
-              <a:pPr/>
-              <a:t>4</a:t>
-            </a:fld>
-            <a:endParaRPr lang="en-US"/>
-          </a:p>
-        </p:txBody>
-      </p:sp>
-    </p:spTree>
-    <p:extLst>
-      <p:ext uri="{BB962C8B-B14F-4D97-AF65-F5344CB8AC3E}">
-        <p14:creationId xmlns:p14="http://schemas.microsoft.com/office/powerpoint/2010/main" val="352562801"/>
-      </p:ext>
-    </p:extLst>
-  </p:cSld>
-  <p:clrMapOvr>
-    <a:masterClrMapping/>
-  </p:clrMapOvr>
-  <p:timing>
-    <p:tnLst>
-      <p:par>
-        <p:cTn id="1" dur="indefinite" restart="never" nodeType="tmRoot">
-          <p:childTnLst>
-            <p:seq concurrent="1" nextAc="seek">
-              <p:cTn id="2" dur="indefinite" nodeType="mainSeq">
-                <p:childTnLst>
-                  <p:par>
-                    <p:cTn id="3" fill="hold">
-                      <p:stCondLst>
-                        <p:cond delay="indefinite"/>
-                      </p:stCondLst>
-                      <p:childTnLst>
-                        <p:par>
-                          <p:cTn id="4" fill="hold">
-                            <p:stCondLst>
-                              <p:cond delay="0"/>
-                            </p:stCondLst>
-                            <p:childTnLst>
-                              <p:par>
-                                <p:cTn id="5" presetID="1" presetClass="entr" presetSubtype="0" fill="hold" grpId="0" nodeType="clickEffect">
-                                  <p:stCondLst>
-                                    <p:cond delay="0"/>
-                                  </p:stCondLst>
-                                  <p:childTnLst>
-                                    <p:set>
-                                      <p:cBhvr>
-                                        <p:cTn id="6" dur="1" fill="hold">
-                                          <p:stCondLst>
-                                            <p:cond delay="0"/>
-                                          </p:stCondLst>
-                                        </p:cTn>
-                                        <p:tgtEl>
-                                          <p:spTgt spid="3">
-                                            <p:txEl>
-                                              <p:pRg st="0" end="0"/>
-                                            </p:txEl>
-                                          </p:spTgt>
-                                        </p:tgtEl>
-                                        <p:attrNameLst>
-                                          <p:attrName>style.visibility</p:attrName>
-                                        </p:attrNameLst>
-                                      </p:cBhvr>
-                                      <p:to>
-                                        <p:strVal val="visible"/>
-                                      </p:to>
-                                    </p:set>
-                                  </p:childTnLst>
-                                </p:cTn>
-                              </p:par>
-                              <p:par>
-                                <p:cTn id="7" presetID="1" presetClass="entr" presetSubtype="0" fill="hold" grpId="0" nodeType="withEffect">
-                                  <p:stCondLst>
-                                    <p:cond delay="0"/>
-                                  </p:stCondLst>
-                                  <p:childTnLst>
-                                    <p:set>
-                                      <p:cBhvr>
-                                        <p:cTn id="8" dur="1" fill="hold">
-                                          <p:stCondLst>
-                                            <p:cond delay="0"/>
-                                          </p:stCondLst>
-                                        </p:cTn>
-                                        <p:tgtEl>
-                                          <p:spTgt spid="3">
-                                            <p:txEl>
-                                              <p:pRg st="1" end="1"/>
-                                            </p:txEl>
-                                          </p:spTgt>
-                                        </p:tgtEl>
-                                        <p:attrNameLst>
-                                          <p:attrName>style.visibility</p:attrName>
-                                        </p:attrNameLst>
-                                      </p:cBhvr>
-                                      <p:to>
-                                        <p:strVal val="visible"/>
-                                      </p:to>
-                                    </p:set>
-                                  </p:childTnLst>
-                                </p:cTn>
-                              </p:par>
-                              <p:par>
-                                <p:cTn id="9" presetID="1" presetClass="entr" presetSubtype="0" fill="hold" grpId="0" nodeType="withEffect">
-                                  <p:stCondLst>
-                                    <p:cond delay="0"/>
-                                  </p:stCondLst>
-                                  <p:childTnLst>
-                                    <p:set>
-                                      <p:cBhvr>
-                                        <p:cTn id="10" dur="1" fill="hold">
-                                          <p:stCondLst>
-                                            <p:cond delay="0"/>
-                                          </p:stCondLst>
-                                        </p:cTn>
-                                        <p:tgtEl>
-                                          <p:spTgt spid="3">
-                                            <p:txEl>
-                                              <p:pRg st="2" end="2"/>
-                                            </p:txEl>
-                                          </p:spTgt>
-                                        </p:tgtEl>
-                                        <p:attrNameLst>
-                                          <p:attrName>style.visibility</p:attrName>
-                                        </p:attrNameLst>
-                                      </p:cBhvr>
-                                      <p:to>
-                                        <p:strVal val="visible"/>
-                                      </p:to>
-                                    </p:set>
-                                  </p:childTnLst>
-                                </p:cTn>
-                              </p:par>
-                              <p:par>
-                                <p:cTn id="11" presetID="1" presetClass="entr" presetSubtype="0" fill="hold" grpId="0" nodeType="withEffect">
-                                  <p:stCondLst>
-                                    <p:cond delay="0"/>
-                                  </p:stCondLst>
-                                  <p:childTnLst>
-                                    <p:set>
-                                      <p:cBhvr>
-                                        <p:cTn id="12" dur="1" fill="hold">
-                                          <p:stCondLst>
-                                            <p:cond delay="0"/>
-                                          </p:stCondLst>
-                                        </p:cTn>
-                                        <p:tgtEl>
-                                          <p:spTgt spid="3">
-                                            <p:txEl>
-                                              <p:pRg st="3" end="3"/>
-                                            </p:txEl>
-                                          </p:spTgt>
-                                        </p:tgtEl>
-                                        <p:attrNameLst>
-                                          <p:attrName>style.visibility</p:attrName>
-                                        </p:attrNameLst>
-                                      </p:cBhvr>
-                                      <p:to>
-                                        <p:strVal val="visible"/>
-                                      </p:to>
-                                    </p:set>
-                                  </p:childTnLst>
-                                </p:cTn>
-                              </p:par>
-                            </p:childTnLst>
-                          </p:cTn>
-                        </p:par>
-                      </p:childTnLst>
-                    </p:cTn>
-                  </p:par>
-                  <p:par>
-                    <p:cTn id="13" fill="hold">
-                      <p:stCondLst>
-                        <p:cond delay="indefinite"/>
-                      </p:stCondLst>
-                      <p:childTnLst>
-                        <p:par>
-                          <p:cTn id="14" fill="hold">
-                            <p:stCondLst>
-                              <p:cond delay="0"/>
-                            </p:stCondLst>
-                            <p:childTnLst>
-                              <p:par>
-                                <p:cTn id="15" presetID="1" presetClass="entr" presetSubtype="0" fill="hold" grpId="0" nodeType="clickEffect">
-                                  <p:stCondLst>
-                                    <p:cond delay="0"/>
-                                  </p:stCondLst>
-                                  <p:childTnLst>
-                                    <p:set>
-                                      <p:cBhvr>
-                                        <p:cTn id="16" dur="1" fill="hold">
-                                          <p:stCondLst>
-                                            <p:cond delay="0"/>
-                                          </p:stCondLst>
-                                        </p:cTn>
-                                        <p:tgtEl>
-                                          <p:spTgt spid="3">
-                                            <p:txEl>
-                                              <p:pRg st="4" end="4"/>
-                                            </p:txEl>
-                                          </p:spTgt>
-                                        </p:tgtEl>
-                                        <p:attrNameLst>
-                                          <p:attrName>style.visibility</p:attrName>
-                                        </p:attrNameLst>
-                                      </p:cBhvr>
-                                      <p:to>
-                                        <p:strVal val="visible"/>
-                                      </p:to>
-                                    </p:set>
-                                  </p:childTnLst>
-                                </p:cTn>
-                              </p:par>
-                              <p:par>
-                                <p:cTn id="17" presetID="1" presetClass="entr" presetSubtype="0" fill="hold" grpId="0" nodeType="withEffect">
-                                  <p:stCondLst>
-                                    <p:cond delay="0"/>
-                                  </p:stCondLst>
-                                  <p:childTnLst>
-                                    <p:set>
-                                      <p:cBhvr>
-                                        <p:cTn id="18" dur="1" fill="hold">
-                                          <p:stCondLst>
-                                            <p:cond delay="0"/>
-                                          </p:stCondLst>
-                                        </p:cTn>
-                                        <p:tgtEl>
-                                          <p:spTgt spid="3">
-                                            <p:txEl>
-                                              <p:pRg st="5" end="5"/>
-                                            </p:txEl>
-                                          </p:spTgt>
-                                        </p:tgtEl>
-                                        <p:attrNameLst>
-                                          <p:attrName>style.visibility</p:attrName>
-                                        </p:attrNameLst>
-                                      </p:cBhvr>
-                                      <p:to>
-                                        <p:strVal val="visible"/>
-                                      </p:to>
-                                    </p:set>
-                                  </p:childTnLst>
-                                </p:cTn>
-                              </p:par>
-                              <p:par>
-                                <p:cTn id="19" presetID="1" presetClass="entr" presetSubtype="0" fill="hold" grpId="0" nodeType="withEffect">
-                                  <p:stCondLst>
-                                    <p:cond delay="0"/>
-                                  </p:stCondLst>
-                                  <p:childTnLst>
-                                    <p:set>
-                                      <p:cBhvr>
-                                        <p:cTn id="20" dur="1" fill="hold">
-                                          <p:stCondLst>
-                                            <p:cond delay="0"/>
-                                          </p:stCondLst>
-                                        </p:cTn>
-                                        <p:tgtEl>
-                                          <p:spTgt spid="3">
-                                            <p:txEl>
-                                              <p:pRg st="6" end="6"/>
-                                            </p:txEl>
-                                          </p:spTgt>
-                                        </p:tgtEl>
-                                        <p:attrNameLst>
-                                          <p:attrName>style.visibility</p:attrName>
-                                        </p:attrNameLst>
-                                      </p:cBhvr>
-                                      <p:to>
-                                        <p:strVal val="visible"/>
-                                      </p:to>
-                                    </p:set>
-                                  </p:childTnLst>
-                                </p:cTn>
-                              </p:par>
-                              <p:par>
-                                <p:cTn id="21" presetID="1" presetClass="entr" presetSubtype="0" fill="hold" grpId="0" nodeType="withEffect">
-                                  <p:stCondLst>
-                                    <p:cond delay="0"/>
-                                  </p:stCondLst>
-                                  <p:childTnLst>
-                                    <p:set>
-                                      <p:cBhvr>
-                                        <p:cTn id="22" dur="1" fill="hold">
-                                          <p:stCondLst>
-                                            <p:cond delay="0"/>
-                                          </p:stCondLst>
-                                        </p:cTn>
-                                        <p:tgtEl>
-                                          <p:spTgt spid="3">
-                                            <p:txEl>
-                                              <p:pRg st="7" end="7"/>
-                                            </p:txEl>
-                                          </p:spTgt>
-                                        </p:tgtEl>
-                                        <p:attrNameLst>
-                                          <p:attrName>style.visibility</p:attrName>
-                                        </p:attrNameLst>
-                                      </p:cBhvr>
-                                      <p:to>
-                                        <p:strVal val="visible"/>
-                                      </p:to>
-                                    </p:set>
-                                  </p:childTnLst>
-                                </p:cTn>
-                              </p:par>
-                            </p:childTnLst>
-                          </p:cTn>
-                        </p:par>
-                      </p:childTnLst>
-                    </p:cTn>
-                  </p:par>
-                </p:childTnLst>
-              </p:cTn>
-              <p:prevCondLst>
-                <p:cond evt="onPrev" delay="0">
-                  <p:tgtEl>
-                    <p:sldTgt/>
-                  </p:tgtEl>
-                </p:cond>
-              </p:prevCondLst>
-              <p:nextCondLst>
-                <p:cond evt="onNext" delay="0">
-                  <p:tgtEl>
-                    <p:sldTgt/>
-                  </p:tgtEl>
-                </p:cond>
-              </p:nextCondLst>
-            </p:seq>
-          </p:childTnLst>
-        </p:cTn>
-      </p:par>
-    </p:tnLst>
-    <p:bldLst>
-      <p:bldP spid="3" grpId="0" build="p"/>
-    </p:bldLst>
-  </p:timing>
-</p:sld>
-</file>
-
-<file path=ppt/slides/slide40.xml><?xml version="1.0" encoding="utf-8"?>
-<p:sld xmlns:a="http://schemas.openxmlformats.org/drawingml/2006/main" xmlns:r="http://schemas.openxmlformats.org/officeDocument/2006/relationships" xmlns:p="http://schemas.openxmlformats.org/presentationml/2006/main">
-  <p:cSld>
-    <p:spTree>
-      <p:nvGrpSpPr>
-        <p:cNvPr id="1" name=""/>
-        <p:cNvGrpSpPr/>
-        <p:nvPr/>
-      </p:nvGrpSpPr>
-      <p:grpSpPr>
-        <a:xfrm>
-          <a:off x="0" y="0"/>
-          <a:ext cx="0" cy="0"/>
-          <a:chOff x="0" y="0"/>
-          <a:chExt cx="0" cy="0"/>
-        </a:xfrm>
-      </p:grpSpPr>
-      <p:sp>
-        <p:nvSpPr>
-          <p:cNvPr id="2" name="Title 1"/>
-          <p:cNvSpPr>
-            <a:spLocks noGrp="1"/>
-          </p:cNvSpPr>
-          <p:nvPr>
-            <p:ph type="title"/>
-          </p:nvPr>
-        </p:nvSpPr>
-        <p:spPr/>
-        <p:txBody>
-          <a:bodyPr/>
-          <a:lstStyle/>
-          <a:p>
-            <a:r>
-              <a:rPr lang="en-US" dirty="0"/>
-              <a:t>Summary</a:t>
-            </a:r>
-          </a:p>
-        </p:txBody>
-      </p:sp>
-      <p:sp>
-        <p:nvSpPr>
-          <p:cNvPr id="3" name="Content Placeholder 2"/>
-          <p:cNvSpPr>
-            <a:spLocks noGrp="1"/>
-          </p:cNvSpPr>
-          <p:nvPr>
-            <p:ph idx="1"/>
-          </p:nvPr>
-        </p:nvSpPr>
-        <p:spPr/>
-        <p:txBody>
-          <a:bodyPr/>
-          <a:lstStyle/>
-          <a:p>
-            <a:r>
-              <a:rPr lang="en-US" dirty="0"/>
               <a:t>TCP works even though it has many flaws</a:t>
             </a:r>
           </a:p>
@@ -34099,7 +34303,7 @@
             <a:fld id="{A190D881-957A-7944-A8D0-1584E528B88F}" type="slidenum">
               <a:rPr lang="en-US" smtClean="0"/>
               <a:pPr/>
-              <a:t>40</a:t>
+              <a:t>41</a:t>
             </a:fld>
             <a:endParaRPr lang="en-US"/>
           </a:p>

</xml_diff>